<commit_message>
add final final ppt
</commit_message>
<xml_diff>
--- a/Geo presentation.pptx
+++ b/Geo presentation.pptx
@@ -5,25 +5,24 @@
     <p:sldMasterId id="2147483660" r:id="rId1"/>
   </p:sldMasterIdLst>
   <p:notesMasterIdLst>
-    <p:notesMasterId r:id="rId18"/>
+    <p:notesMasterId r:id="rId17"/>
   </p:notesMasterIdLst>
   <p:sldIdLst>
     <p:sldId id="256" r:id="rId2"/>
     <p:sldId id="257" r:id="rId3"/>
     <p:sldId id="258" r:id="rId4"/>
-    <p:sldId id="262" r:id="rId5"/>
+    <p:sldId id="270" r:id="rId5"/>
     <p:sldId id="259" r:id="rId6"/>
-    <p:sldId id="260" r:id="rId7"/>
-    <p:sldId id="261" r:id="rId8"/>
-    <p:sldId id="267" r:id="rId9"/>
-    <p:sldId id="263" r:id="rId10"/>
+    <p:sldId id="261" r:id="rId7"/>
+    <p:sldId id="267" r:id="rId8"/>
+    <p:sldId id="263" r:id="rId9"/>
+    <p:sldId id="264" r:id="rId10"/>
     <p:sldId id="269" r:id="rId11"/>
-    <p:sldId id="264" r:id="rId12"/>
-    <p:sldId id="266" r:id="rId13"/>
-    <p:sldId id="270" r:id="rId14"/>
-    <p:sldId id="265" r:id="rId15"/>
-    <p:sldId id="271" r:id="rId16"/>
-    <p:sldId id="268" r:id="rId17"/>
+    <p:sldId id="266" r:id="rId12"/>
+    <p:sldId id="271" r:id="rId13"/>
+    <p:sldId id="272" r:id="rId14"/>
+    <p:sldId id="273" r:id="rId15"/>
+    <p:sldId id="268" r:id="rId16"/>
   </p:sldIdLst>
   <p:sldSz cx="9144000" cy="6858000" type="screen4x3"/>
   <p:notesSz cx="6858000" cy="9144000"/>
@@ -124,7 +123,7 @@
   </p:defaultTextStyle>
   <p:extLst>
     <p:ext uri="{EFAFB233-063F-42B5-8137-9DF3F51BA10A}">
-      <p15:sldGuideLst xmlns:p15="http://schemas.microsoft.com/office/powerpoint/2012/main">
+      <p15:sldGuideLst xmlns="" xmlns:p15="http://schemas.microsoft.com/office/powerpoint/2012/main">
         <p15:guide id="1" orient="horz" pos="2160">
           <p15:clr>
             <a:srgbClr val="A4A3A4"/>
@@ -165,7 +164,7 @@
       </p:grpSpPr>
       <p:sp>
         <p:nvSpPr>
-          <p:cNvPr id="2" name="Header Placeholder 1"/>
+          <p:cNvPr id="2" name="页眉占位符 1"/>
           <p:cNvSpPr>
             <a:spLocks noGrp="1"/>
           </p:cNvSpPr>
@@ -176,7 +175,7 @@
         <p:spPr>
           <a:xfrm>
             <a:off x="0" y="0"/>
-            <a:ext cx="2971800" cy="458788"/>
+            <a:ext cx="2971800" cy="457200"/>
           </a:xfrm>
           <a:prstGeom prst="rect">
             <a:avLst/>
@@ -190,13 +189,13 @@
             </a:lvl1pPr>
           </a:lstStyle>
           <a:p>
-            <a:endParaRPr lang="en-US"/>
-          </a:p>
-        </p:txBody>
-      </p:sp>
-      <p:sp>
-        <p:nvSpPr>
-          <p:cNvPr id="3" name="Date Placeholder 2"/>
+            <a:endParaRPr kumimoji="1" lang="zh-CN" altLang="en-US"/>
+          </a:p>
+        </p:txBody>
+      </p:sp>
+      <p:sp>
+        <p:nvSpPr>
+          <p:cNvPr id="3" name="日期占位符 2"/>
           <p:cNvSpPr>
             <a:spLocks noGrp="1"/>
           </p:cNvSpPr>
@@ -207,7 +206,7 @@
         <p:spPr>
           <a:xfrm>
             <a:off x="3884613" y="0"/>
-            <a:ext cx="2971800" cy="458788"/>
+            <a:ext cx="2971800" cy="457200"/>
           </a:xfrm>
           <a:prstGeom prst="rect">
             <a:avLst/>
@@ -221,17 +220,17 @@
             </a:lvl1pPr>
           </a:lstStyle>
           <a:p>
-            <a:fld id="{CD35E57B-DE4A-2A43-9ADD-729D6B6500A6}" type="datetimeFigureOut">
-              <a:rPr lang="en-US" smtClean="0"/>
+            <a:fld id="{4BC318F0-8BBA-6242-840D-4984E2FE3C73}" type="datetimeFigureOut">
+              <a:rPr kumimoji="1" lang="zh-CN" altLang="en-US" smtClean="0"/>
               <a:t>12/21/15</a:t>
             </a:fld>
-            <a:endParaRPr lang="en-US"/>
-          </a:p>
-        </p:txBody>
-      </p:sp>
-      <p:sp>
-        <p:nvSpPr>
-          <p:cNvPr id="4" name="Slide Image Placeholder 3"/>
+            <a:endParaRPr kumimoji="1" lang="zh-CN" altLang="en-US"/>
+          </a:p>
+        </p:txBody>
+      </p:sp>
+      <p:sp>
+        <p:nvSpPr>
+          <p:cNvPr id="4" name="幻灯片图像占位符 3"/>
           <p:cNvSpPr>
             <a:spLocks noGrp="1" noRot="1" noChangeAspect="1"/>
           </p:cNvSpPr>
@@ -241,8 +240,8 @@
         </p:nvSpPr>
         <p:spPr>
           <a:xfrm>
-            <a:off x="1371600" y="1143000"/>
-            <a:ext cx="4114800" cy="3086100"/>
+            <a:off x="1143000" y="685800"/>
+            <a:ext cx="4572000" cy="3429000"/>
           </a:xfrm>
           <a:prstGeom prst="rect">
             <a:avLst/>
@@ -258,13 +257,13 @@
           <a:bodyPr vert="horz" lIns="91440" tIns="45720" rIns="91440" bIns="45720" rtlCol="0" anchor="ctr"/>
           <a:lstStyle/>
           <a:p>
-            <a:endParaRPr lang="en-US"/>
-          </a:p>
-        </p:txBody>
-      </p:sp>
-      <p:sp>
-        <p:nvSpPr>
-          <p:cNvPr id="5" name="Notes Placeholder 4"/>
+            <a:endParaRPr lang="zh-CN" altLang="en-US"/>
+          </a:p>
+        </p:txBody>
+      </p:sp>
+      <p:sp>
+        <p:nvSpPr>
+          <p:cNvPr id="5" name="备注占位符 4"/>
           <p:cNvSpPr>
             <a:spLocks noGrp="1"/>
           </p:cNvSpPr>
@@ -274,8 +273,8 @@
         </p:nvSpPr>
         <p:spPr>
           <a:xfrm>
-            <a:off x="685800" y="4400550"/>
-            <a:ext cx="5486400" cy="3600450"/>
+            <a:off x="685800" y="4343400"/>
+            <a:ext cx="5486400" cy="4114800"/>
           </a:xfrm>
           <a:prstGeom prst="rect">
             <a:avLst/>
@@ -287,44 +286,44 @@
           <a:p>
             <a:pPr lvl="0"/>
             <a:r>
-              <a:rPr lang="en-US" smtClean="0"/>
-              <a:t>Click to edit Master text styles</a:t>
+              <a:rPr kumimoji="1" lang="zh-CN" altLang="en-US" smtClean="0"/>
+              <a:t>单击此处编辑母版文本样式</a:t>
             </a:r>
           </a:p>
           <a:p>
             <a:pPr lvl="1"/>
             <a:r>
-              <a:rPr lang="en-US" smtClean="0"/>
-              <a:t>Second level</a:t>
+              <a:rPr kumimoji="1" lang="zh-CN" altLang="en-US" smtClean="0"/>
+              <a:t>二级</a:t>
             </a:r>
           </a:p>
           <a:p>
             <a:pPr lvl="2"/>
             <a:r>
-              <a:rPr lang="en-US" smtClean="0"/>
-              <a:t>Third level</a:t>
+              <a:rPr kumimoji="1" lang="zh-CN" altLang="en-US" smtClean="0"/>
+              <a:t>三级</a:t>
             </a:r>
           </a:p>
           <a:p>
             <a:pPr lvl="3"/>
             <a:r>
-              <a:rPr lang="en-US" smtClean="0"/>
-              <a:t>Fourth level</a:t>
+              <a:rPr kumimoji="1" lang="zh-CN" altLang="en-US" smtClean="0"/>
+              <a:t>四级</a:t>
             </a:r>
           </a:p>
           <a:p>
             <a:pPr lvl="4"/>
             <a:r>
-              <a:rPr lang="en-US" smtClean="0"/>
-              <a:t>Fifth level</a:t>
-            </a:r>
-            <a:endParaRPr lang="en-US"/>
-          </a:p>
-        </p:txBody>
-      </p:sp>
-      <p:sp>
-        <p:nvSpPr>
-          <p:cNvPr id="6" name="Footer Placeholder 5"/>
+              <a:rPr kumimoji="1" lang="zh-CN" altLang="en-US" smtClean="0"/>
+              <a:t>五级</a:t>
+            </a:r>
+            <a:endParaRPr kumimoji="1" lang="zh-CN" altLang="en-US"/>
+          </a:p>
+        </p:txBody>
+      </p:sp>
+      <p:sp>
+        <p:nvSpPr>
+          <p:cNvPr id="6" name="页脚占位符 5"/>
           <p:cNvSpPr>
             <a:spLocks noGrp="1"/>
           </p:cNvSpPr>
@@ -335,7 +334,7 @@
         <p:spPr>
           <a:xfrm>
             <a:off x="0" y="8685213"/>
-            <a:ext cx="2971800" cy="458787"/>
+            <a:ext cx="2971800" cy="457200"/>
           </a:xfrm>
           <a:prstGeom prst="rect">
             <a:avLst/>
@@ -349,13 +348,13 @@
             </a:lvl1pPr>
           </a:lstStyle>
           <a:p>
-            <a:endParaRPr lang="en-US"/>
-          </a:p>
-        </p:txBody>
-      </p:sp>
-      <p:sp>
-        <p:nvSpPr>
-          <p:cNvPr id="7" name="Slide Number Placeholder 6"/>
+            <a:endParaRPr kumimoji="1" lang="zh-CN" altLang="en-US"/>
+          </a:p>
+        </p:txBody>
+      </p:sp>
+      <p:sp>
+        <p:nvSpPr>
+          <p:cNvPr id="7" name="幻灯片编号占位符 6"/>
           <p:cNvSpPr>
             <a:spLocks noGrp="1"/>
           </p:cNvSpPr>
@@ -366,7 +365,7 @@
         <p:spPr>
           <a:xfrm>
             <a:off x="3884613" y="8685213"/>
-            <a:ext cx="2971800" cy="458787"/>
+            <a:ext cx="2971800" cy="457200"/>
           </a:xfrm>
           <a:prstGeom prst="rect">
             <a:avLst/>
@@ -380,24 +379,24 @@
             </a:lvl1pPr>
           </a:lstStyle>
           <a:p>
-            <a:fld id="{DCAD8E2A-8875-3048-895E-B8077FAF8E10}" type="slidenum">
-              <a:rPr lang="en-US" smtClean="0"/>
+            <a:fld id="{731F0344-5E1F-8F4A-8102-32C37DA0C9B7}" type="slidenum">
+              <a:rPr kumimoji="1" lang="zh-CN" altLang="en-US" smtClean="0"/>
               <a:t>‹#›</a:t>
             </a:fld>
-            <a:endParaRPr lang="en-US"/>
+            <a:endParaRPr kumimoji="1" lang="zh-CN" altLang="en-US"/>
           </a:p>
         </p:txBody>
       </p:sp>
     </p:spTree>
     <p:extLst>
       <p:ext uri="{BB962C8B-B14F-4D97-AF65-F5344CB8AC3E}">
-        <p14:creationId xmlns:p14="http://schemas.microsoft.com/office/powerpoint/2010/main" val="665636010"/>
+        <p14:creationId xmlns:p14="http://schemas.microsoft.com/office/powerpoint/2010/main" val="3841137504"/>
       </p:ext>
     </p:extLst>
   </p:cSld>
   <p:clrMap bg1="lt1" tx1="dk1" bg2="lt2" tx2="dk2" accent1="accent1" accent2="accent2" accent3="accent3" accent4="accent4" accent5="accent5" accent6="accent6" hlink="hlink" folHlink="folHlink"/>
   <p:notesStyle>
-    <a:lvl1pPr marL="0" algn="l" defTabSz="914400" rtl="0" eaLnBrk="1" latinLnBrk="0" hangingPunct="1">
+    <a:lvl1pPr marL="0" algn="l" defTabSz="457200" rtl="0" eaLnBrk="1" latinLnBrk="0" hangingPunct="1">
       <a:defRPr sz="1200" kern="1200">
         <a:solidFill>
           <a:schemeClr val="tx1"/>
@@ -407,7 +406,7 @@
         <a:cs typeface="+mn-cs"/>
       </a:defRPr>
     </a:lvl1pPr>
-    <a:lvl2pPr marL="457200" algn="l" defTabSz="914400" rtl="0" eaLnBrk="1" latinLnBrk="0" hangingPunct="1">
+    <a:lvl2pPr marL="457200" algn="l" defTabSz="457200" rtl="0" eaLnBrk="1" latinLnBrk="0" hangingPunct="1">
       <a:defRPr sz="1200" kern="1200">
         <a:solidFill>
           <a:schemeClr val="tx1"/>
@@ -417,7 +416,7 @@
         <a:cs typeface="+mn-cs"/>
       </a:defRPr>
     </a:lvl2pPr>
-    <a:lvl3pPr marL="914400" algn="l" defTabSz="914400" rtl="0" eaLnBrk="1" latinLnBrk="0" hangingPunct="1">
+    <a:lvl3pPr marL="914400" algn="l" defTabSz="457200" rtl="0" eaLnBrk="1" latinLnBrk="0" hangingPunct="1">
       <a:defRPr sz="1200" kern="1200">
         <a:solidFill>
           <a:schemeClr val="tx1"/>
@@ -427,7 +426,7 @@
         <a:cs typeface="+mn-cs"/>
       </a:defRPr>
     </a:lvl3pPr>
-    <a:lvl4pPr marL="1371600" algn="l" defTabSz="914400" rtl="0" eaLnBrk="1" latinLnBrk="0" hangingPunct="1">
+    <a:lvl4pPr marL="1371600" algn="l" defTabSz="457200" rtl="0" eaLnBrk="1" latinLnBrk="0" hangingPunct="1">
       <a:defRPr sz="1200" kern="1200">
         <a:solidFill>
           <a:schemeClr val="tx1"/>
@@ -437,7 +436,7 @@
         <a:cs typeface="+mn-cs"/>
       </a:defRPr>
     </a:lvl4pPr>
-    <a:lvl5pPr marL="1828800" algn="l" defTabSz="914400" rtl="0" eaLnBrk="1" latinLnBrk="0" hangingPunct="1">
+    <a:lvl5pPr marL="1828800" algn="l" defTabSz="457200" rtl="0" eaLnBrk="1" latinLnBrk="0" hangingPunct="1">
       <a:defRPr sz="1200" kern="1200">
         <a:solidFill>
           <a:schemeClr val="tx1"/>
@@ -447,7 +446,7 @@
         <a:cs typeface="+mn-cs"/>
       </a:defRPr>
     </a:lvl5pPr>
-    <a:lvl6pPr marL="2286000" algn="l" defTabSz="914400" rtl="0" eaLnBrk="1" latinLnBrk="0" hangingPunct="1">
+    <a:lvl6pPr marL="2286000" algn="l" defTabSz="457200" rtl="0" eaLnBrk="1" latinLnBrk="0" hangingPunct="1">
       <a:defRPr sz="1200" kern="1200">
         <a:solidFill>
           <a:schemeClr val="tx1"/>
@@ -457,7 +456,7 @@
         <a:cs typeface="+mn-cs"/>
       </a:defRPr>
     </a:lvl6pPr>
-    <a:lvl7pPr marL="2743200" algn="l" defTabSz="914400" rtl="0" eaLnBrk="1" latinLnBrk="0" hangingPunct="1">
+    <a:lvl7pPr marL="2743200" algn="l" defTabSz="457200" rtl="0" eaLnBrk="1" latinLnBrk="0" hangingPunct="1">
       <a:defRPr sz="1200" kern="1200">
         <a:solidFill>
           <a:schemeClr val="tx1"/>
@@ -467,7 +466,7 @@
         <a:cs typeface="+mn-cs"/>
       </a:defRPr>
     </a:lvl7pPr>
-    <a:lvl8pPr marL="3200400" algn="l" defTabSz="914400" rtl="0" eaLnBrk="1" latinLnBrk="0" hangingPunct="1">
+    <a:lvl8pPr marL="3200400" algn="l" defTabSz="457200" rtl="0" eaLnBrk="1" latinLnBrk="0" hangingPunct="1">
       <a:defRPr sz="1200" kern="1200">
         <a:solidFill>
           <a:schemeClr val="tx1"/>
@@ -477,7 +476,7 @@
         <a:cs typeface="+mn-cs"/>
       </a:defRPr>
     </a:lvl8pPr>
-    <a:lvl9pPr marL="3657600" algn="l" defTabSz="914400" rtl="0" eaLnBrk="1" latinLnBrk="0" hangingPunct="1">
+    <a:lvl9pPr marL="3657600" algn="l" defTabSz="457200" rtl="0" eaLnBrk="1" latinLnBrk="0" hangingPunct="1">
       <a:defRPr sz="1200" kern="1200">
         <a:solidFill>
           <a:schemeClr val="tx1"/>
@@ -510,6 +509,106 @@
       </p:grpSpPr>
       <p:sp>
         <p:nvSpPr>
+          <p:cNvPr id="2" name="幻灯片图像占位符 1"/>
+          <p:cNvSpPr>
+            <a:spLocks noGrp="1" noRot="1" noChangeAspect="1"/>
+          </p:cNvSpPr>
+          <p:nvPr>
+            <p:ph type="sldImg"/>
+          </p:nvPr>
+        </p:nvSpPr>
+        <p:spPr/>
+      </p:sp>
+      <p:sp>
+        <p:nvSpPr>
+          <p:cNvPr id="3" name="备注占位符 2"/>
+          <p:cNvSpPr>
+            <a:spLocks noGrp="1"/>
+          </p:cNvSpPr>
+          <p:nvPr>
+            <p:ph type="body" idx="1"/>
+          </p:nvPr>
+        </p:nvSpPr>
+        <p:spPr/>
+        <p:txBody>
+          <a:bodyPr/>
+          <a:lstStyle/>
+          <a:p>
+            <a:r>
+              <a:rPr kumimoji="1" lang="en-US" altLang="zh-CN" dirty="0" smtClean="0"/>
+              <a:t>Through</a:t>
+            </a:r>
+            <a:r>
+              <a:rPr kumimoji="1" lang="en-US" altLang="zh-CN" baseline="0" dirty="0" smtClean="0"/>
+              <a:t> Geo, u</a:t>
+            </a:r>
+            <a:r>
+              <a:rPr kumimoji="1" lang="en-US" altLang="zh-CN" dirty="0" smtClean="0"/>
+              <a:t>sers can</a:t>
+            </a:r>
+            <a:r>
+              <a:rPr kumimoji="1" lang="en-US" altLang="zh-CN" baseline="0" dirty="0" smtClean="0"/>
+              <a:t> create and manipulate graphs intuitively.</a:t>
+            </a:r>
+            <a:endParaRPr kumimoji="1" lang="zh-CN" altLang="en-US" dirty="0"/>
+          </a:p>
+        </p:txBody>
+      </p:sp>
+      <p:sp>
+        <p:nvSpPr>
+          <p:cNvPr id="4" name="幻灯片编号占位符 3"/>
+          <p:cNvSpPr>
+            <a:spLocks noGrp="1"/>
+          </p:cNvSpPr>
+          <p:nvPr>
+            <p:ph type="sldNum" sz="quarter" idx="10"/>
+          </p:nvPr>
+        </p:nvSpPr>
+        <p:spPr/>
+        <p:txBody>
+          <a:bodyPr/>
+          <a:lstStyle/>
+          <a:p>
+            <a:fld id="{731F0344-5E1F-8F4A-8102-32C37DA0C9B7}" type="slidenum">
+              <a:rPr kumimoji="1" lang="zh-CN" altLang="en-US" smtClean="0"/>
+              <a:t>2</a:t>
+            </a:fld>
+            <a:endParaRPr kumimoji="1" lang="zh-CN" altLang="en-US"/>
+          </a:p>
+        </p:txBody>
+      </p:sp>
+    </p:spTree>
+    <p:extLst>
+      <p:ext uri="{BB962C8B-B14F-4D97-AF65-F5344CB8AC3E}">
+        <p14:creationId xmlns:p14="http://schemas.microsoft.com/office/powerpoint/2010/main" val="296395562"/>
+      </p:ext>
+    </p:extLst>
+  </p:cSld>
+  <p:clrMapOvr>
+    <a:masterClrMapping/>
+  </p:clrMapOvr>
+</p:notes>
+</file>
+
+<file path=ppt/notesSlides/notesSlide2.xml><?xml version="1.0" encoding="utf-8"?>
+<p:notes xmlns:a="http://schemas.openxmlformats.org/drawingml/2006/main" xmlns:r="http://schemas.openxmlformats.org/officeDocument/2006/relationships" xmlns:p="http://schemas.openxmlformats.org/presentationml/2006/main">
+  <p:cSld>
+    <p:spTree>
+      <p:nvGrpSpPr>
+        <p:cNvPr id="1" name=""/>
+        <p:cNvGrpSpPr/>
+        <p:nvPr/>
+      </p:nvGrpSpPr>
+      <p:grpSpPr>
+        <a:xfrm>
+          <a:off x="0" y="0"/>
+          <a:ext cx="0" cy="0"/>
+          <a:chOff x="0" y="0"/>
+          <a:chExt cx="0" cy="0"/>
+        </a:xfrm>
+      </p:grpSpPr>
+      <p:sp>
+        <p:nvSpPr>
           <p:cNvPr id="2" name="Slide Image Placeholder 1"/>
           <p:cNvSpPr>
             <a:spLocks noGrp="1" noRot="1" noChangeAspect="1"/>
@@ -556,7 +655,7 @@
           <a:p>
             <a:fld id="{DCAD8E2A-8875-3048-895E-B8077FAF8E10}" type="slidenum">
               <a:rPr lang="en-US" smtClean="0"/>
-              <a:t>15</a:t>
+              <a:t>14</a:t>
             </a:fld>
             <a:endParaRPr lang="en-US"/>
           </a:p>
@@ -8990,7 +9089,7 @@
   <p:timing>
     <p:tnLst>
       <p:par>
-        <p:cTn id="1" dur="indefinite" restart="never" nodeType="tmRoot"/>
+        <p:cTn xmlns:p14="http://schemas.microsoft.com/office/powerpoint/2010/main" id="1" dur="indefinite" restart="never" nodeType="tmRoot"/>
       </p:par>
     </p:tnLst>
   </p:timing>
@@ -9647,7 +9746,7 @@
     </p:spTree>
     <p:extLst>
       <p:ext uri="{BB962C8B-B14F-4D97-AF65-F5344CB8AC3E}">
-        <p14:creationId xmlns:p14="http://schemas.microsoft.com/office/powerpoint/2010/main" val="318333694"/>
+        <p14:creationId xmlns:p14="http://schemas.microsoft.com/office/powerpoint/2010/main" val="762231423"/>
       </p:ext>
     </p:extLst>
   </p:cSld>
@@ -9657,7 +9756,7 @@
   <p:timing>
     <p:tnLst>
       <p:par>
-        <p:cTn id="1" dur="indefinite" restart="never" nodeType="tmRoot"/>
+        <p:cTn xmlns:p14="http://schemas.microsoft.com/office/powerpoint/2010/main" id="1" dur="indefinite" restart="never" nodeType="tmRoot"/>
       </p:par>
     </p:tnLst>
   </p:timing>
@@ -9665,214 +9764,6 @@
 </file>
 
 <file path=ppt/slides/slide11.xml><?xml version="1.0" encoding="utf-8"?>
-<p:sld xmlns:a="http://schemas.openxmlformats.org/drawingml/2006/main" xmlns:r="http://schemas.openxmlformats.org/officeDocument/2006/relationships" xmlns:p="http://schemas.openxmlformats.org/presentationml/2006/main">
-  <p:cSld>
-    <p:spTree>
-      <p:nvGrpSpPr>
-        <p:cNvPr id="1" name=""/>
-        <p:cNvGrpSpPr/>
-        <p:nvPr/>
-      </p:nvGrpSpPr>
-      <p:grpSpPr>
-        <a:xfrm>
-          <a:off x="0" y="0"/>
-          <a:ext cx="0" cy="0"/>
-          <a:chOff x="0" y="0"/>
-          <a:chExt cx="0" cy="0"/>
-        </a:xfrm>
-      </p:grpSpPr>
-      <p:sp>
-        <p:nvSpPr>
-          <p:cNvPr id="2" name="标题 1"/>
-          <p:cNvSpPr>
-            <a:spLocks noGrp="1"/>
-          </p:cNvSpPr>
-          <p:nvPr>
-            <p:ph type="title"/>
-          </p:nvPr>
-        </p:nvSpPr>
-        <p:spPr/>
-        <p:txBody>
-          <a:bodyPr/>
-          <a:lstStyle/>
-          <a:p>
-            <a:r>
-              <a:rPr kumimoji="1" lang="en-US" altLang="zh-CN" dirty="0"/>
-              <a:t>Code </a:t>
-            </a:r>
-            <a:r>
-              <a:rPr kumimoji="1" lang="en-US" altLang="zh-CN" dirty="0" smtClean="0"/>
-              <a:t>Generation</a:t>
-            </a:r>
-            <a:endParaRPr kumimoji="1" lang="zh-CN" altLang="en-US" dirty="0">
-              <a:solidFill>
-                <a:srgbClr val="FF0000"/>
-              </a:solidFill>
-            </a:endParaRPr>
-          </a:p>
-        </p:txBody>
-      </p:sp>
-      <p:sp>
-        <p:nvSpPr>
-          <p:cNvPr id="3" name="内容占位符 2"/>
-          <p:cNvSpPr>
-            <a:spLocks noGrp="1"/>
-          </p:cNvSpPr>
-          <p:nvPr>
-            <p:ph idx="1"/>
-          </p:nvPr>
-        </p:nvSpPr>
-        <p:spPr>
-          <a:xfrm>
-            <a:off x="498474" y="1600200"/>
-            <a:ext cx="7556313" cy="4144963"/>
-          </a:xfrm>
-        </p:spPr>
-        <p:txBody>
-          <a:bodyPr/>
-          <a:lstStyle/>
-          <a:p>
-            <a:r>
-              <a:rPr kumimoji="1" lang="en-US" altLang="zh-CN" sz="2400" dirty="0" smtClean="0">
-                <a:solidFill>
-                  <a:schemeClr val="accent1"/>
-                </a:solidFill>
-              </a:rPr>
-              <a:t>Algorithm Example (</a:t>
-            </a:r>
-            <a:r>
-              <a:rPr kumimoji="1" lang="en-US" altLang="zh-CN" sz="2400" dirty="0" err="1" smtClean="0">
-                <a:solidFill>
-                  <a:schemeClr val="accent1"/>
-                </a:solidFill>
-              </a:rPr>
-              <a:t>demo_fb.g</a:t>
-            </a:r>
-            <a:r>
-              <a:rPr kumimoji="1" lang="en-US" altLang="zh-CN" sz="2400" dirty="0" smtClean="0">
-                <a:solidFill>
-                  <a:schemeClr val="accent1"/>
-                </a:solidFill>
-              </a:rPr>
-              <a:t>)</a:t>
-            </a:r>
-          </a:p>
-          <a:p>
-            <a:endParaRPr kumimoji="1" lang="en-US" altLang="zh-CN" sz="2400" dirty="0" smtClean="0">
-              <a:solidFill>
-                <a:schemeClr val="accent1"/>
-              </a:solidFill>
-            </a:endParaRPr>
-          </a:p>
-        </p:txBody>
-      </p:sp>
-      <p:sp>
-        <p:nvSpPr>
-          <p:cNvPr id="4" name="TextBox 3"/>
-          <p:cNvSpPr txBox="1"/>
-          <p:nvPr/>
-        </p:nvSpPr>
-        <p:spPr>
-          <a:xfrm>
-            <a:off x="2871788" y="2657475"/>
-            <a:ext cx="184731" cy="369332"/>
-          </a:xfrm>
-          <a:prstGeom prst="rect">
-            <a:avLst/>
-          </a:prstGeom>
-          <a:noFill/>
-        </p:spPr>
-        <p:txBody>
-          <a:bodyPr wrap="none" rtlCol="0">
-            <a:spAutoFit/>
-          </a:bodyPr>
-          <a:lstStyle/>
-          <a:p>
-            <a:endParaRPr lang="en-US" dirty="0"/>
-          </a:p>
-        </p:txBody>
-      </p:sp>
-      <p:pic>
-        <p:nvPicPr>
-          <p:cNvPr id="6" name="Picture 5"/>
-          <p:cNvPicPr>
-            <a:picLocks noChangeAspect="1"/>
-          </p:cNvPicPr>
-          <p:nvPr/>
-        </p:nvPicPr>
-        <p:blipFill>
-          <a:blip r:embed="rId2">
-            <a:extLst>
-              <a:ext uri="{28A0092B-C50C-407E-A947-70E740481C1C}">
-                <a14:useLocalDpi xmlns:a14="http://schemas.microsoft.com/office/drawing/2010/main" val="0"/>
-              </a:ext>
-            </a:extLst>
-          </a:blip>
-          <a:stretch>
-            <a:fillRect/>
-          </a:stretch>
-        </p:blipFill>
-        <p:spPr>
-          <a:xfrm>
-            <a:off x="625368" y="2206625"/>
-            <a:ext cx="3937000" cy="3759200"/>
-          </a:xfrm>
-          <a:prstGeom prst="rect">
-            <a:avLst/>
-          </a:prstGeom>
-        </p:spPr>
-      </p:pic>
-      <p:pic>
-        <p:nvPicPr>
-          <p:cNvPr id="7" name="Picture 6"/>
-          <p:cNvPicPr>
-            <a:picLocks noChangeAspect="1"/>
-          </p:cNvPicPr>
-          <p:nvPr/>
-        </p:nvPicPr>
-        <p:blipFill>
-          <a:blip r:embed="rId3">
-            <a:extLst>
-              <a:ext uri="{28A0092B-C50C-407E-A947-70E740481C1C}">
-                <a14:useLocalDpi xmlns:a14="http://schemas.microsoft.com/office/drawing/2010/main" val="0"/>
-              </a:ext>
-            </a:extLst>
-          </a:blip>
-          <a:stretch>
-            <a:fillRect/>
-          </a:stretch>
-        </p:blipFill>
-        <p:spPr>
-          <a:xfrm>
-            <a:off x="4689262" y="2206625"/>
-            <a:ext cx="4013200" cy="3225800"/>
-          </a:xfrm>
-          <a:prstGeom prst="rect">
-            <a:avLst/>
-          </a:prstGeom>
-        </p:spPr>
-      </p:pic>
-    </p:spTree>
-    <p:extLst>
-      <p:ext uri="{BB962C8B-B14F-4D97-AF65-F5344CB8AC3E}">
-        <p14:creationId xmlns:p14="http://schemas.microsoft.com/office/powerpoint/2010/main" val="46623091"/>
-      </p:ext>
-    </p:extLst>
-  </p:cSld>
-  <p:clrMapOvr>
-    <a:masterClrMapping/>
-  </p:clrMapOvr>
-  <p:timing>
-    <p:tnLst>
-      <p:par>
-        <p:cTn id="1" dur="indefinite" restart="never" nodeType="tmRoot"/>
-      </p:par>
-    </p:tnLst>
-  </p:timing>
-</p:sld>
-</file>
-
-<file path=ppt/slides/slide12.xml><?xml version="1.0" encoding="utf-8"?>
 <p:sld xmlns:a="http://schemas.openxmlformats.org/drawingml/2006/main" xmlns:r="http://schemas.openxmlformats.org/officeDocument/2006/relationships" xmlns:p="http://schemas.openxmlformats.org/presentationml/2006/main">
   <p:cSld>
     <p:spTree>
@@ -10061,14 +9952,14 @@
   <p:timing>
     <p:tnLst>
       <p:par>
-        <p:cTn id="1" dur="indefinite" restart="never" nodeType="tmRoot"/>
+        <p:cTn xmlns:p14="http://schemas.microsoft.com/office/powerpoint/2010/main" id="1" dur="indefinite" restart="never" nodeType="tmRoot"/>
       </p:par>
     </p:tnLst>
   </p:timing>
 </p:sld>
 </file>
 
-<file path=ppt/slides/slide13.xml><?xml version="1.0" encoding="utf-8"?>
+<file path=ppt/slides/slide12.xml><?xml version="1.0" encoding="utf-8"?>
 <p:sld xmlns:a="http://schemas.openxmlformats.org/drawingml/2006/main" xmlns:r="http://schemas.openxmlformats.org/officeDocument/2006/relationships" xmlns:p="http://schemas.openxmlformats.org/presentationml/2006/main">
   <p:cSld>
     <p:spTree>
@@ -10155,14 +10046,14 @@
           <p:nvPr>
             <p:extLst>
               <p:ext uri="{D42A27DB-BD31-4B8C-83A1-F6EECF244321}">
-                <p14:modId xmlns:p14="http://schemas.microsoft.com/office/powerpoint/2010/main" val="1247412082"/>
+                <p14:modId xmlns:p14="http://schemas.microsoft.com/office/powerpoint/2010/main" val="3211087083"/>
               </p:ext>
             </p:extLst>
           </p:nvPr>
         </p:nvGraphicFramePr>
         <p:xfrm>
-          <a:off x="269872" y="1539240"/>
-          <a:ext cx="8397874" cy="5181600"/>
+          <a:off x="498473" y="1996440"/>
+          <a:ext cx="8397874" cy="4663440"/>
         </p:xfrm>
         <a:graphic>
           <a:graphicData uri="http://schemas.openxmlformats.org/drawingml/2006/table">
@@ -10185,7 +10076,7 @@
                     <a:p>
                       <a:pPr algn="ctr"/>
                       <a:r>
-                        <a:rPr lang="en-US" altLang="zh-CN" sz="1400" kern="1200" dirty="0" smtClean="0">
+                        <a:rPr lang="en-US" altLang="zh-CN" sz="1200" kern="1200" dirty="0" smtClean="0">
                           <a:solidFill>
                             <a:schemeClr val="tx1"/>
                           </a:solidFill>
@@ -10196,7 +10087,7 @@
                         </a:rPr>
                         <a:t>File</a:t>
                       </a:r>
-                      <a:endParaRPr lang="zh-CN" altLang="en-US" sz="1400" kern="1200" dirty="0">
+                      <a:endParaRPr lang="zh-CN" altLang="en-US" sz="1200" kern="1200" dirty="0">
                         <a:solidFill>
                           <a:schemeClr val="tx1"/>
                         </a:solidFill>
@@ -10216,10 +10107,10 @@
                     <a:p>
                       <a:pPr algn="ctr"/>
                       <a:r>
-                        <a:rPr lang="en-US" altLang="zh-CN" sz="1400" dirty="0" smtClean="0"/>
+                        <a:rPr lang="en-US" altLang="zh-CN" sz="1200" dirty="0" smtClean="0"/>
                         <a:t>Lines</a:t>
                       </a:r>
-                      <a:endParaRPr lang="zh-CN" altLang="en-US" sz="1400" dirty="0"/>
+                      <a:endParaRPr lang="zh-CN" altLang="en-US" sz="1200" dirty="0"/>
                     </a:p>
                   </a:txBody>
                   <a:tcPr/>
@@ -10231,7 +10122,7 @@
                     <a:p>
                       <a:pPr algn="ctr"/>
                       <a:r>
-                        <a:rPr lang="en-US" altLang="zh-CN" sz="1400" kern="1200" dirty="0" smtClean="0">
+                        <a:rPr lang="en-US" altLang="zh-CN" sz="1200" kern="1200" dirty="0" smtClean="0">
                           <a:solidFill>
                             <a:schemeClr val="tx1"/>
                           </a:solidFill>
@@ -10242,7 +10133,7 @@
                         </a:rPr>
                         <a:t>File</a:t>
                       </a:r>
-                      <a:endParaRPr lang="zh-CN" altLang="en-US" sz="1400" kern="1200" dirty="0">
+                      <a:endParaRPr lang="zh-CN" altLang="en-US" sz="1200" kern="1200" dirty="0">
                         <a:solidFill>
                           <a:schemeClr val="tx1"/>
                         </a:solidFill>
@@ -10262,10 +10153,10 @@
                     <a:p>
                       <a:pPr algn="ctr"/>
                       <a:r>
-                        <a:rPr lang="en-US" altLang="zh-CN" sz="1400" dirty="0" smtClean="0"/>
+                        <a:rPr lang="en-US" altLang="zh-CN" sz="1200" dirty="0" smtClean="0"/>
                         <a:t>Lines</a:t>
                       </a:r>
-                      <a:endParaRPr lang="zh-CN" altLang="en-US" sz="1400" dirty="0"/>
+                      <a:endParaRPr lang="zh-CN" altLang="en-US" sz="1200" dirty="0"/>
                     </a:p>
                   </a:txBody>
                   <a:tcPr/>
@@ -10277,10 +10168,10 @@
                     <a:p>
                       <a:pPr algn="ctr"/>
                       <a:r>
-                        <a:rPr lang="en-US" altLang="zh-CN" sz="1400" dirty="0" smtClean="0"/>
+                        <a:rPr lang="en-US" altLang="zh-CN" sz="1200" dirty="0" smtClean="0"/>
                         <a:t>Role</a:t>
                       </a:r>
-                      <a:endParaRPr lang="zh-CN" altLang="en-US" sz="1400" dirty="0"/>
+                      <a:endParaRPr lang="zh-CN" altLang="en-US" sz="1200" dirty="0"/>
                     </a:p>
                   </a:txBody>
                   <a:tcPr/>
@@ -10294,7 +10185,7 @@
                     <a:p>
                       <a:pPr algn="ctr" fontAlgn="b"/>
                       <a:r>
-                        <a:rPr lang="en-US" sz="1400" kern="1200" dirty="0">
+                        <a:rPr lang="en-US" sz="1200" kern="1200" dirty="0">
                           <a:solidFill>
                             <a:schemeClr val="tx1"/>
                           </a:solidFill>
@@ -10306,7 +10197,7 @@
                         <a:t>test-</a:t>
                       </a:r>
                       <a:r>
-                        <a:rPr lang="en-US" sz="1400" kern="1200" dirty="0" err="1">
+                        <a:rPr lang="en-US" sz="1200" kern="1200" dirty="0" err="1">
                           <a:solidFill>
                             <a:schemeClr val="tx1"/>
                           </a:solidFill>
@@ -10317,7 +10208,7 @@
                         </a:rPr>
                         <a:t>assignments.g</a:t>
                       </a:r>
-                      <a:endParaRPr lang="en-US" sz="1400" kern="1200" dirty="0">
+                      <a:endParaRPr lang="en-US" sz="1200" kern="1200" dirty="0">
                         <a:solidFill>
                           <a:schemeClr val="tx1"/>
                         </a:solidFill>
@@ -10337,10 +10228,10 @@
                     <a:p>
                       <a:pPr algn="ctr"/>
                       <a:r>
-                        <a:rPr lang="en-US" altLang="zh-CN" sz="1400" dirty="0" smtClean="0"/>
+                        <a:rPr lang="en-US" altLang="zh-CN" sz="1200" dirty="0" smtClean="0"/>
                         <a:t>14</a:t>
                       </a:r>
-                      <a:endParaRPr lang="zh-CN" altLang="en-US" sz="1400" dirty="0"/>
+                      <a:endParaRPr lang="zh-CN" altLang="en-US" sz="1200" dirty="0"/>
                     </a:p>
                   </a:txBody>
                   <a:tcPr anchor="ctr"/>
@@ -10352,7 +10243,7 @@
                     <a:p>
                       <a:pPr algn="ctr" fontAlgn="b"/>
                       <a:r>
-                        <a:rPr lang="en-US" sz="1400" kern="1200" dirty="0">
+                        <a:rPr lang="en-US" sz="1200" kern="1200" dirty="0">
                           <a:solidFill>
                             <a:schemeClr val="tx1"/>
                           </a:solidFill>
@@ -10364,7 +10255,7 @@
                         <a:t>test-</a:t>
                       </a:r>
                       <a:r>
-                        <a:rPr lang="en-US" sz="1400" kern="1200" dirty="0" err="1">
+                        <a:rPr lang="en-US" sz="1200" kern="1200" dirty="0" err="1">
                           <a:solidFill>
                             <a:schemeClr val="tx1"/>
                           </a:solidFill>
@@ -10375,7 +10266,7 @@
                         </a:rPr>
                         <a:t>assignments.ref</a:t>
                       </a:r>
-                      <a:endParaRPr lang="en-US" sz="1400" kern="1200" dirty="0">
+                      <a:endParaRPr lang="en-US" sz="1200" kern="1200" dirty="0">
                         <a:solidFill>
                           <a:schemeClr val="tx1"/>
                         </a:solidFill>
@@ -10395,10 +10286,10 @@
                     <a:p>
                       <a:pPr algn="ctr"/>
                       <a:r>
-                        <a:rPr lang="en-US" altLang="zh-CN" sz="1400" dirty="0" smtClean="0"/>
+                        <a:rPr lang="en-US" altLang="zh-CN" sz="1200" dirty="0" smtClean="0"/>
                         <a:t>6</a:t>
                       </a:r>
-                      <a:endParaRPr lang="zh-CN" altLang="en-US" sz="1400" dirty="0"/>
+                      <a:endParaRPr lang="zh-CN" altLang="en-US" sz="1200" dirty="0"/>
                     </a:p>
                   </a:txBody>
                   <a:tcPr anchor="ctr"/>
@@ -10426,7 +10317,7 @@
                         <a:defRPr/>
                       </a:pPr>
                       <a:r>
-                        <a:rPr lang="en-US" altLang="zh-CN" sz="1400" kern="1200" dirty="0" smtClean="0">
+                        <a:rPr lang="en-US" altLang="zh-CN" sz="1200" kern="1200" dirty="0" smtClean="0">
                           <a:solidFill>
                             <a:schemeClr val="tx1"/>
                           </a:solidFill>
@@ -10438,7 +10329,7 @@
                         <a:t>All</a:t>
                       </a:r>
                       <a:r>
-                        <a:rPr lang="en-US" altLang="zh-CN" sz="1400" kern="1200" baseline="0" dirty="0" smtClean="0">
+                        <a:rPr lang="en-US" altLang="zh-CN" sz="1200" kern="1200" baseline="0" dirty="0" smtClean="0">
                           <a:solidFill>
                             <a:schemeClr val="tx1"/>
                           </a:solidFill>
@@ -10450,7 +10341,7 @@
                         <a:t> kinds of assignments</a:t>
                       </a:r>
                       <a:r>
-                        <a:rPr lang="en-US" altLang="zh-CN" sz="1400" kern="1200" dirty="0" smtClean="0">
+                        <a:rPr lang="en-US" altLang="zh-CN" sz="1200" kern="1200" dirty="0" smtClean="0">
                           <a:solidFill>
                             <a:schemeClr val="tx1"/>
                           </a:solidFill>
@@ -10461,7 +10352,7 @@
                         </a:rPr>
                         <a:t> </a:t>
                       </a:r>
-                      <a:endParaRPr lang="en-US" altLang="zh-CN" sz="1400" dirty="0" smtClean="0">
+                      <a:endParaRPr lang="en-US" altLang="zh-CN" sz="1200" dirty="0" smtClean="0">
                         <a:effectLst/>
                       </a:endParaRPr>
                     </a:p>
@@ -10477,7 +10368,7 @@
                     <a:p>
                       <a:pPr algn="ctr" fontAlgn="b"/>
                       <a:r>
-                        <a:rPr lang="en-US" sz="1400" kern="1200" dirty="0">
+                        <a:rPr lang="en-US" sz="1200" kern="1200" dirty="0">
                           <a:solidFill>
                             <a:schemeClr val="tx1"/>
                           </a:solidFill>
@@ -10489,7 +10380,7 @@
                         <a:t>test-</a:t>
                       </a:r>
                       <a:r>
-                        <a:rPr lang="en-US" sz="1400" kern="1200" dirty="0" err="1">
+                        <a:rPr lang="en-US" sz="1200" kern="1200" dirty="0" err="1">
                           <a:solidFill>
                             <a:schemeClr val="tx1"/>
                           </a:solidFill>
@@ -10500,7 +10391,7 @@
                         </a:rPr>
                         <a:t>circle.g</a:t>
                       </a:r>
-                      <a:endParaRPr lang="en-US" sz="1400" kern="1200" dirty="0">
+                      <a:endParaRPr lang="en-US" sz="1200" kern="1200" dirty="0">
                         <a:solidFill>
                           <a:schemeClr val="tx1"/>
                         </a:solidFill>
@@ -10520,10 +10411,10 @@
                     <a:p>
                       <a:pPr algn="ctr"/>
                       <a:r>
-                        <a:rPr lang="en-US" altLang="zh-CN" sz="1400" dirty="0" smtClean="0"/>
+                        <a:rPr lang="en-US" altLang="zh-CN" sz="1200" dirty="0" smtClean="0"/>
                         <a:t>19</a:t>
                       </a:r>
-                      <a:endParaRPr lang="zh-CN" altLang="en-US" sz="1400" dirty="0"/>
+                      <a:endParaRPr lang="zh-CN" altLang="en-US" sz="1200" dirty="0"/>
                     </a:p>
                   </a:txBody>
                   <a:tcPr anchor="ctr"/>
@@ -10535,7 +10426,7 @@
                     <a:p>
                       <a:pPr algn="ctr" fontAlgn="b"/>
                       <a:r>
-                        <a:rPr lang="en-US" sz="1400" kern="1200" dirty="0">
+                        <a:rPr lang="en-US" sz="1200" kern="1200" dirty="0">
                           <a:solidFill>
                             <a:schemeClr val="tx1"/>
                           </a:solidFill>
@@ -10547,7 +10438,7 @@
                         <a:t>test-</a:t>
                       </a:r>
                       <a:r>
-                        <a:rPr lang="en-US" sz="1400" kern="1200" dirty="0" err="1">
+                        <a:rPr lang="en-US" sz="1200" kern="1200" dirty="0" err="1">
                           <a:solidFill>
                             <a:schemeClr val="tx1"/>
                           </a:solidFill>
@@ -10558,7 +10449,7 @@
                         </a:rPr>
                         <a:t>circle.ref</a:t>
                       </a:r>
-                      <a:endParaRPr lang="en-US" sz="1400" kern="1200" dirty="0">
+                      <a:endParaRPr lang="en-US" sz="1200" kern="1200" dirty="0">
                         <a:solidFill>
                           <a:schemeClr val="tx1"/>
                         </a:solidFill>
@@ -10578,10 +10469,10 @@
                     <a:p>
                       <a:pPr algn="ctr"/>
                       <a:r>
-                        <a:rPr lang="en-US" altLang="zh-CN" sz="1400" dirty="0" smtClean="0"/>
+                        <a:rPr lang="en-US" altLang="zh-CN" sz="1200" dirty="0" smtClean="0"/>
                         <a:t>12</a:t>
                       </a:r>
-                      <a:endParaRPr lang="zh-CN" altLang="en-US" sz="1400" dirty="0"/>
+                      <a:endParaRPr lang="zh-CN" altLang="en-US" sz="1200" dirty="0"/>
                     </a:p>
                   </a:txBody>
                   <a:tcPr anchor="ctr"/>
@@ -10609,36 +10500,36 @@
                         <a:defRPr/>
                       </a:pPr>
                       <a:r>
-                        <a:rPr lang="en-US" altLang="zh-CN" sz="1400" dirty="0" smtClean="0">
+                        <a:rPr lang="en-US" altLang="zh-CN" sz="1200" dirty="0" smtClean="0">
                           <a:effectLst/>
                         </a:rPr>
                         <a:t>Geo type</a:t>
                       </a:r>
                       <a:r>
-                        <a:rPr lang="en-US" altLang="zh-CN" sz="1400" baseline="0" dirty="0" smtClean="0">
+                        <a:rPr lang="en-US" altLang="zh-CN" sz="1200" baseline="0" dirty="0" smtClean="0">
                           <a:effectLst/>
                         </a:rPr>
                         <a:t> circle &amp; </a:t>
                       </a:r>
                       <a:r>
-                        <a:rPr lang="en-US" altLang="zh-CN" sz="1400" baseline="0" dirty="0" err="1" smtClean="0">
+                        <a:rPr lang="en-US" altLang="zh-CN" sz="1200" baseline="0" dirty="0" err="1" smtClean="0">
                           <a:effectLst/>
                         </a:rPr>
                         <a:t>obj</a:t>
                       </a:r>
                       <a:r>
-                        <a:rPr lang="en-US" altLang="zh-CN" sz="1400" baseline="0" dirty="0" smtClean="0">
+                        <a:rPr lang="en-US" altLang="zh-CN" sz="1200" baseline="0" dirty="0" smtClean="0">
                           <a:effectLst/>
                         </a:rPr>
                         <a:t> </a:t>
                       </a:r>
                       <a:r>
-                        <a:rPr lang="en-US" altLang="zh-CN" sz="1400" baseline="0" dirty="0" err="1" smtClean="0">
+                        <a:rPr lang="en-US" altLang="zh-CN" sz="1200" baseline="0" dirty="0" err="1" smtClean="0">
                           <a:effectLst/>
                         </a:rPr>
                         <a:t>funcs</a:t>
                       </a:r>
-                      <a:endParaRPr lang="en-US" altLang="zh-CN" sz="1400" dirty="0" smtClean="0">
+                      <a:endParaRPr lang="en-US" altLang="zh-CN" sz="1200" dirty="0" smtClean="0">
                         <a:effectLst/>
                       </a:endParaRPr>
                     </a:p>
@@ -10654,7 +10545,7 @@
                     <a:p>
                       <a:pPr algn="ctr" fontAlgn="b"/>
                       <a:r>
-                        <a:rPr lang="en-US" sz="1400" kern="1200" dirty="0">
+                        <a:rPr lang="en-US" sz="1200" kern="1200" dirty="0">
                           <a:solidFill>
                             <a:schemeClr val="tx1"/>
                           </a:solidFill>
@@ -10666,7 +10557,7 @@
                         <a:t>test-</a:t>
                       </a:r>
                       <a:r>
-                        <a:rPr lang="en-US" sz="1400" kern="1200" dirty="0" err="1">
+                        <a:rPr lang="en-US" sz="1200" kern="1200" dirty="0" err="1">
                           <a:solidFill>
                             <a:schemeClr val="tx1"/>
                           </a:solidFill>
@@ -10677,7 +10568,7 @@
                         </a:rPr>
                         <a:t>comparison.g</a:t>
                       </a:r>
-                      <a:endParaRPr lang="en-US" sz="1400" kern="1200" dirty="0">
+                      <a:endParaRPr lang="en-US" sz="1200" kern="1200" dirty="0">
                         <a:solidFill>
                           <a:schemeClr val="tx1"/>
                         </a:solidFill>
@@ -10697,10 +10588,10 @@
                     <a:p>
                       <a:pPr algn="ctr"/>
                       <a:r>
-                        <a:rPr lang="en-US" altLang="zh-CN" sz="1400" dirty="0" smtClean="0"/>
+                        <a:rPr lang="en-US" altLang="zh-CN" sz="1200" dirty="0" smtClean="0"/>
                         <a:t>11</a:t>
                       </a:r>
-                      <a:endParaRPr lang="zh-CN" altLang="en-US" sz="1400" dirty="0"/>
+                      <a:endParaRPr lang="zh-CN" altLang="en-US" sz="1200" dirty="0"/>
                     </a:p>
                   </a:txBody>
                   <a:tcPr anchor="ctr"/>
@@ -10712,7 +10603,7 @@
                     <a:p>
                       <a:pPr algn="ctr" fontAlgn="b"/>
                       <a:r>
-                        <a:rPr lang="en-US" sz="1400" kern="1200" dirty="0">
+                        <a:rPr lang="en-US" sz="1200" kern="1200" dirty="0">
                           <a:solidFill>
                             <a:schemeClr val="tx1"/>
                           </a:solidFill>
@@ -10724,7 +10615,7 @@
                         <a:t>test-</a:t>
                       </a:r>
                       <a:r>
-                        <a:rPr lang="en-US" sz="1400" kern="1200" dirty="0" err="1">
+                        <a:rPr lang="en-US" sz="1200" kern="1200" dirty="0" err="1">
                           <a:solidFill>
                             <a:schemeClr val="tx1"/>
                           </a:solidFill>
@@ -10735,7 +10626,7 @@
                         </a:rPr>
                         <a:t>comparison.ref</a:t>
                       </a:r>
-                      <a:endParaRPr lang="en-US" sz="1400" kern="1200" dirty="0">
+                      <a:endParaRPr lang="en-US" sz="1200" kern="1200" dirty="0">
                         <a:solidFill>
                           <a:schemeClr val="tx1"/>
                         </a:solidFill>
@@ -10755,10 +10646,10 @@
                     <a:p>
                       <a:pPr algn="ctr"/>
                       <a:r>
-                        <a:rPr lang="en-US" altLang="zh-CN" sz="1400" dirty="0" smtClean="0"/>
+                        <a:rPr lang="en-US" altLang="zh-CN" sz="1200" dirty="0" smtClean="0"/>
                         <a:t>6</a:t>
                       </a:r>
-                      <a:endParaRPr lang="zh-CN" altLang="en-US" sz="1400" dirty="0"/>
+                      <a:endParaRPr lang="zh-CN" altLang="en-US" sz="1200" dirty="0"/>
                     </a:p>
                   </a:txBody>
                   <a:tcPr anchor="ctr"/>
@@ -10786,30 +10677,30 @@
                         <a:defRPr/>
                       </a:pPr>
                       <a:r>
-                        <a:rPr lang="en-US" altLang="zh-CN" sz="1400" dirty="0" smtClean="0">
+                        <a:rPr lang="en-US" altLang="zh-CN" sz="1200" dirty="0" smtClean="0">
                           <a:effectLst/>
                         </a:rPr>
                         <a:t>Comparison</a:t>
                       </a:r>
                       <a:r>
-                        <a:rPr lang="en-US" altLang="zh-CN" sz="1400" baseline="0" dirty="0" smtClean="0">
+                        <a:rPr lang="en-US" altLang="zh-CN" sz="1200" baseline="0" dirty="0" smtClean="0">
                           <a:effectLst/>
                         </a:rPr>
                         <a:t> &amp; </a:t>
                       </a:r>
                       <a:r>
-                        <a:rPr lang="en-US" altLang="zh-CN" sz="1400" baseline="0" dirty="0" err="1" smtClean="0">
+                        <a:rPr lang="en-US" altLang="zh-CN" sz="1200" baseline="0" dirty="0" err="1" smtClean="0">
                           <a:effectLst/>
                         </a:rPr>
                         <a:t>boolean</a:t>
                       </a:r>
                       <a:r>
-                        <a:rPr lang="en-US" altLang="zh-CN" sz="1400" baseline="0" dirty="0" smtClean="0">
+                        <a:rPr lang="en-US" altLang="zh-CN" sz="1200" baseline="0" dirty="0" smtClean="0">
                           <a:effectLst/>
                         </a:rPr>
                         <a:t> opts</a:t>
                       </a:r>
-                      <a:endParaRPr lang="en-US" altLang="zh-CN" sz="1400" dirty="0" smtClean="0">
+                      <a:endParaRPr lang="en-US" altLang="zh-CN" sz="1200" dirty="0" smtClean="0">
                         <a:effectLst/>
                       </a:endParaRPr>
                     </a:p>
@@ -10825,7 +10716,7 @@
                     <a:p>
                       <a:pPr algn="ctr" fontAlgn="b"/>
                       <a:r>
-                        <a:rPr lang="en-US" sz="1400" kern="1200" dirty="0">
+                        <a:rPr lang="en-US" sz="1200" kern="1200" dirty="0">
                           <a:solidFill>
                             <a:schemeClr val="tx1"/>
                           </a:solidFill>
@@ -10837,7 +10728,7 @@
                         <a:t>test-</a:t>
                       </a:r>
                       <a:r>
-                        <a:rPr lang="en-US" sz="1400" kern="1200" dirty="0" err="1">
+                        <a:rPr lang="en-US" sz="1200" kern="1200" dirty="0" err="1">
                           <a:solidFill>
                             <a:schemeClr val="tx1"/>
                           </a:solidFill>
@@ -10848,7 +10739,7 @@
                         </a:rPr>
                         <a:t>dot.g</a:t>
                       </a:r>
-                      <a:endParaRPr lang="en-US" sz="1400" kern="1200" dirty="0">
+                      <a:endParaRPr lang="en-US" sz="1200" kern="1200" dirty="0">
                         <a:solidFill>
                           <a:schemeClr val="tx1"/>
                         </a:solidFill>
@@ -10868,7 +10759,7 @@
                     <a:p>
                       <a:pPr algn="ctr"/>
                       <a:r>
-                        <a:rPr lang="en-US" altLang="zh-CN" sz="1400" dirty="0" smtClean="0"/>
+                        <a:rPr lang="en-US" altLang="zh-CN" sz="1200" dirty="0" smtClean="0"/>
                         <a:t>7</a:t>
                       </a:r>
                     </a:p>
@@ -10882,7 +10773,7 @@
                     <a:p>
                       <a:pPr algn="ctr" fontAlgn="b"/>
                       <a:r>
-                        <a:rPr lang="en-US" sz="1400" kern="1200" dirty="0">
+                        <a:rPr lang="en-US" sz="1200" kern="1200" dirty="0">
                           <a:solidFill>
                             <a:schemeClr val="tx1"/>
                           </a:solidFill>
@@ -10894,7 +10785,7 @@
                         <a:t>test-</a:t>
                       </a:r>
                       <a:r>
-                        <a:rPr lang="en-US" sz="1400" kern="1200" dirty="0" err="1">
+                        <a:rPr lang="en-US" sz="1200" kern="1200" dirty="0" err="1">
                           <a:solidFill>
                             <a:schemeClr val="tx1"/>
                           </a:solidFill>
@@ -10905,7 +10796,7 @@
                         </a:rPr>
                         <a:t>dot.ref</a:t>
                       </a:r>
-                      <a:endParaRPr lang="en-US" sz="1400" kern="1200" dirty="0">
+                      <a:endParaRPr lang="en-US" sz="1200" kern="1200" dirty="0">
                         <a:solidFill>
                           <a:schemeClr val="tx1"/>
                         </a:solidFill>
@@ -10925,10 +10816,10 @@
                     <a:p>
                       <a:pPr algn="ctr"/>
                       <a:r>
-                        <a:rPr lang="en-US" altLang="zh-CN" sz="1400" dirty="0" smtClean="0"/>
+                        <a:rPr lang="en-US" altLang="zh-CN" sz="1200" dirty="0" smtClean="0"/>
                         <a:t>3</a:t>
                       </a:r>
-                      <a:endParaRPr lang="zh-CN" altLang="en-US" sz="1400" dirty="0"/>
+                      <a:endParaRPr lang="zh-CN" altLang="en-US" sz="1200" dirty="0"/>
                     </a:p>
                   </a:txBody>
                   <a:tcPr anchor="ctr"/>
@@ -10956,36 +10847,36 @@
                         <a:defRPr/>
                       </a:pPr>
                       <a:r>
-                        <a:rPr lang="en-US" altLang="zh-CN" sz="1400" dirty="0" smtClean="0">
+                        <a:rPr lang="en-US" altLang="zh-CN" sz="1200" dirty="0" smtClean="0">
                           <a:effectLst/>
                         </a:rPr>
                         <a:t>Geo type dot</a:t>
                       </a:r>
                       <a:r>
-                        <a:rPr lang="en-US" altLang="zh-CN" sz="1400" baseline="0" dirty="0" smtClean="0">
+                        <a:rPr lang="en-US" altLang="zh-CN" sz="1200" baseline="0" dirty="0" smtClean="0">
                           <a:effectLst/>
                         </a:rPr>
                         <a:t> &amp; </a:t>
                       </a:r>
                       <a:r>
-                        <a:rPr lang="en-US" altLang="zh-CN" sz="1400" baseline="0" dirty="0" err="1" smtClean="0">
+                        <a:rPr lang="en-US" altLang="zh-CN" sz="1200" baseline="0" dirty="0" err="1" smtClean="0">
                           <a:effectLst/>
                         </a:rPr>
                         <a:t>obj</a:t>
                       </a:r>
                       <a:r>
-                        <a:rPr lang="en-US" altLang="zh-CN" sz="1400" baseline="0" dirty="0" smtClean="0">
+                        <a:rPr lang="en-US" altLang="zh-CN" sz="1200" baseline="0" dirty="0" smtClean="0">
                           <a:effectLst/>
                         </a:rPr>
                         <a:t> </a:t>
                       </a:r>
                       <a:r>
-                        <a:rPr lang="en-US" altLang="zh-CN" sz="1400" baseline="0" dirty="0" err="1" smtClean="0">
+                        <a:rPr lang="en-US" altLang="zh-CN" sz="1200" baseline="0" dirty="0" err="1" smtClean="0">
                           <a:effectLst/>
                         </a:rPr>
                         <a:t>funcs</a:t>
                       </a:r>
-                      <a:endParaRPr lang="en-US" altLang="zh-CN" sz="1400" dirty="0" smtClean="0">
+                      <a:endParaRPr lang="en-US" altLang="zh-CN" sz="1200" dirty="0" smtClean="0">
                         <a:effectLst/>
                       </a:endParaRPr>
                     </a:p>
@@ -11001,7 +10892,7 @@
                     <a:p>
                       <a:pPr algn="ctr" fontAlgn="b"/>
                       <a:r>
-                        <a:rPr lang="en-US" sz="1400" kern="1200" dirty="0">
+                        <a:rPr lang="en-US" sz="1200" kern="1200" dirty="0">
                           <a:solidFill>
                             <a:schemeClr val="tx1"/>
                           </a:solidFill>
@@ -11013,7 +10904,7 @@
                         <a:t>test-</a:t>
                       </a:r>
                       <a:r>
-                        <a:rPr lang="en-US" sz="1400" kern="1200" dirty="0" err="1">
+                        <a:rPr lang="en-US" sz="1200" kern="1200" dirty="0" err="1">
                           <a:solidFill>
                             <a:schemeClr val="tx1"/>
                           </a:solidFill>
@@ -11024,7 +10915,7 @@
                         </a:rPr>
                         <a:t>fib.g</a:t>
                       </a:r>
-                      <a:endParaRPr lang="en-US" sz="1400" kern="1200" dirty="0">
+                      <a:endParaRPr lang="en-US" sz="1200" kern="1200" dirty="0">
                         <a:solidFill>
                           <a:schemeClr val="tx1"/>
                         </a:solidFill>
@@ -11044,10 +10935,10 @@
                     <a:p>
                       <a:pPr algn="ctr"/>
                       <a:r>
-                        <a:rPr lang="en-US" altLang="zh-CN" sz="1400" dirty="0" smtClean="0"/>
+                        <a:rPr lang="en-US" altLang="zh-CN" sz="1200" dirty="0" smtClean="0"/>
                         <a:t>18</a:t>
                       </a:r>
-                      <a:endParaRPr lang="zh-CN" altLang="en-US" sz="1400" dirty="0"/>
+                      <a:endParaRPr lang="zh-CN" altLang="en-US" sz="1200" dirty="0"/>
                     </a:p>
                   </a:txBody>
                   <a:tcPr anchor="ctr"/>
@@ -11059,7 +10950,7 @@
                     <a:p>
                       <a:pPr algn="ctr" fontAlgn="b"/>
                       <a:r>
-                        <a:rPr lang="en-US" sz="1400" kern="1200" dirty="0">
+                        <a:rPr lang="en-US" sz="1200" kern="1200" dirty="0">
                           <a:solidFill>
                             <a:schemeClr val="tx1"/>
                           </a:solidFill>
@@ -11071,7 +10962,7 @@
                         <a:t>test-</a:t>
                       </a:r>
                       <a:r>
-                        <a:rPr lang="en-US" sz="1400" kern="1200" dirty="0" err="1">
+                        <a:rPr lang="en-US" sz="1200" kern="1200" dirty="0" err="1">
                           <a:solidFill>
                             <a:schemeClr val="tx1"/>
                           </a:solidFill>
@@ -11082,7 +10973,7 @@
                         </a:rPr>
                         <a:t>fib.ref</a:t>
                       </a:r>
-                      <a:endParaRPr lang="en-US" sz="1400" kern="1200" dirty="0">
+                      <a:endParaRPr lang="en-US" sz="1200" kern="1200" dirty="0">
                         <a:solidFill>
                           <a:schemeClr val="tx1"/>
                         </a:solidFill>
@@ -11102,10 +10993,10 @@
                     <a:p>
                       <a:pPr algn="ctr"/>
                       <a:r>
-                        <a:rPr lang="en-US" altLang="zh-CN" sz="1400" dirty="0" smtClean="0"/>
+                        <a:rPr lang="en-US" altLang="zh-CN" sz="1200" dirty="0" smtClean="0"/>
                         <a:t>9</a:t>
                       </a:r>
-                      <a:endParaRPr lang="zh-CN" altLang="en-US" sz="1400" dirty="0"/>
+                      <a:endParaRPr lang="zh-CN" altLang="en-US" sz="1200" dirty="0"/>
                     </a:p>
                   </a:txBody>
                   <a:tcPr anchor="ctr"/>
@@ -11133,18 +11024,18 @@
                         <a:defRPr/>
                       </a:pPr>
                       <a:r>
-                        <a:rPr lang="en-US" altLang="zh-CN" sz="1400" dirty="0" smtClean="0">
+                        <a:rPr lang="en-US" altLang="zh-CN" sz="1200" dirty="0" smtClean="0">
                           <a:effectLst/>
                         </a:rPr>
                         <a:t>Recursive</a:t>
                       </a:r>
                       <a:r>
-                        <a:rPr lang="en-US" altLang="zh-CN" sz="1400" baseline="0" dirty="0" smtClean="0">
+                        <a:rPr lang="en-US" altLang="zh-CN" sz="1200" baseline="0" dirty="0" smtClean="0">
                           <a:effectLst/>
                         </a:rPr>
                         <a:t> function</a:t>
                       </a:r>
-                      <a:endParaRPr lang="en-US" altLang="zh-CN" sz="1400" dirty="0" smtClean="0">
+                      <a:endParaRPr lang="en-US" altLang="zh-CN" sz="1200" dirty="0" smtClean="0">
                         <a:effectLst/>
                       </a:endParaRPr>
                     </a:p>
@@ -11160,7 +11051,7 @@
                     <a:p>
                       <a:pPr algn="ctr" fontAlgn="b"/>
                       <a:r>
-                        <a:rPr lang="en-US" sz="1400" kern="1200" dirty="0">
+                        <a:rPr lang="en-US" sz="1200" kern="1200" dirty="0">
                           <a:solidFill>
                             <a:schemeClr val="tx1"/>
                           </a:solidFill>
@@ -11172,7 +11063,7 @@
                         <a:t>test-</a:t>
                       </a:r>
                       <a:r>
-                        <a:rPr lang="en-US" sz="1400" kern="1200" dirty="0" err="1">
+                        <a:rPr lang="en-US" sz="1200" kern="1200" dirty="0" err="1">
                           <a:solidFill>
                             <a:schemeClr val="tx1"/>
                           </a:solidFill>
@@ -11183,7 +11074,7 @@
                         </a:rPr>
                         <a:t>for.g</a:t>
                       </a:r>
-                      <a:endParaRPr lang="en-US" sz="1400" kern="1200" dirty="0">
+                      <a:endParaRPr lang="en-US" sz="1200" kern="1200" dirty="0">
                         <a:solidFill>
                           <a:schemeClr val="tx1"/>
                         </a:solidFill>
@@ -11203,10 +11094,10 @@
                     <a:p>
                       <a:pPr algn="ctr"/>
                       <a:r>
-                        <a:rPr lang="en-US" altLang="zh-CN" sz="1400" dirty="0" smtClean="0"/>
+                        <a:rPr lang="en-US" altLang="zh-CN" sz="1200" dirty="0" smtClean="0"/>
                         <a:t>5</a:t>
                       </a:r>
-                      <a:endParaRPr lang="zh-CN" altLang="en-US" sz="1400" dirty="0"/>
+                      <a:endParaRPr lang="zh-CN" altLang="en-US" sz="1200" dirty="0"/>
                     </a:p>
                   </a:txBody>
                   <a:tcPr anchor="ctr"/>
@@ -11218,7 +11109,7 @@
                     <a:p>
                       <a:pPr algn="ctr" fontAlgn="b"/>
                       <a:r>
-                        <a:rPr lang="en-US" sz="1400" kern="1200" dirty="0">
+                        <a:rPr lang="en-US" sz="1200" kern="1200" dirty="0">
                           <a:solidFill>
                             <a:schemeClr val="tx1"/>
                           </a:solidFill>
@@ -11230,7 +11121,7 @@
                         <a:t>test-</a:t>
                       </a:r>
                       <a:r>
-                        <a:rPr lang="en-US" sz="1400" kern="1200" dirty="0" err="1">
+                        <a:rPr lang="en-US" sz="1200" kern="1200" dirty="0" err="1">
                           <a:solidFill>
                             <a:schemeClr val="tx1"/>
                           </a:solidFill>
@@ -11241,7 +11132,7 @@
                         </a:rPr>
                         <a:t>for.ref</a:t>
                       </a:r>
-                      <a:endParaRPr lang="en-US" sz="1400" kern="1200" dirty="0">
+                      <a:endParaRPr lang="en-US" sz="1200" kern="1200" dirty="0">
                         <a:solidFill>
                           <a:schemeClr val="tx1"/>
                         </a:solidFill>
@@ -11261,10 +11152,10 @@
                     <a:p>
                       <a:pPr algn="ctr"/>
                       <a:r>
-                        <a:rPr lang="en-US" altLang="zh-CN" sz="1400" dirty="0" smtClean="0"/>
+                        <a:rPr lang="en-US" altLang="zh-CN" sz="1200" dirty="0" smtClean="0"/>
                         <a:t>10</a:t>
                       </a:r>
-                      <a:endParaRPr lang="zh-CN" altLang="en-US" sz="1400" dirty="0"/>
+                      <a:endParaRPr lang="zh-CN" altLang="en-US" sz="1200" dirty="0"/>
                     </a:p>
                   </a:txBody>
                   <a:tcPr anchor="ctr"/>
@@ -11292,7 +11183,7 @@
                         <a:defRPr/>
                       </a:pPr>
                       <a:r>
-                        <a:rPr lang="en-US" altLang="zh-CN" sz="1400" dirty="0" smtClean="0">
+                        <a:rPr lang="en-US" altLang="zh-CN" sz="1200" dirty="0" smtClean="0">
                           <a:effectLst/>
                         </a:rPr>
                         <a:t>For statements</a:t>
@@ -11310,7 +11201,7 @@
                     <a:p>
                       <a:pPr algn="ctr" fontAlgn="b"/>
                       <a:r>
-                        <a:rPr lang="en-US" sz="1400" kern="1200" dirty="0">
+                        <a:rPr lang="en-US" sz="1200" kern="1200" dirty="0">
                           <a:solidFill>
                             <a:schemeClr val="tx1"/>
                           </a:solidFill>
@@ -11322,7 +11213,7 @@
                         <a:t>test-</a:t>
                       </a:r>
                       <a:r>
-                        <a:rPr lang="en-US" sz="1400" kern="1200" dirty="0" err="1">
+                        <a:rPr lang="en-US" sz="1200" kern="1200" dirty="0" err="1">
                           <a:solidFill>
                             <a:schemeClr val="tx1"/>
                           </a:solidFill>
@@ -11333,7 +11224,7 @@
                         </a:rPr>
                         <a:t>function.g</a:t>
                       </a:r>
-                      <a:endParaRPr lang="en-US" sz="1400" kern="1200" dirty="0">
+                      <a:endParaRPr lang="en-US" sz="1200" kern="1200" dirty="0">
                         <a:solidFill>
                           <a:schemeClr val="tx1"/>
                         </a:solidFill>
@@ -11353,10 +11244,10 @@
                     <a:p>
                       <a:pPr algn="ctr"/>
                       <a:r>
-                        <a:rPr lang="en-US" altLang="zh-CN" sz="1400" dirty="0" smtClean="0"/>
+                        <a:rPr lang="en-US" altLang="zh-CN" sz="1200" dirty="0" smtClean="0"/>
                         <a:t>37</a:t>
                       </a:r>
-                      <a:endParaRPr lang="zh-CN" altLang="en-US" sz="1400" dirty="0"/>
+                      <a:endParaRPr lang="zh-CN" altLang="en-US" sz="1200" dirty="0"/>
                     </a:p>
                   </a:txBody>
                   <a:tcPr anchor="ctr"/>
@@ -11368,7 +11259,7 @@
                     <a:p>
                       <a:pPr algn="ctr" fontAlgn="b"/>
                       <a:r>
-                        <a:rPr lang="en-US" sz="1400" kern="1200">
+                        <a:rPr lang="en-US" sz="1200" kern="1200">
                           <a:solidFill>
                             <a:schemeClr val="tx1"/>
                           </a:solidFill>
@@ -11390,10 +11281,10 @@
                     <a:p>
                       <a:pPr algn="ctr"/>
                       <a:r>
-                        <a:rPr lang="en-US" altLang="zh-CN" sz="1400" dirty="0" smtClean="0"/>
+                        <a:rPr lang="en-US" altLang="zh-CN" sz="1200" dirty="0" smtClean="0"/>
                         <a:t>1</a:t>
                       </a:r>
-                      <a:endParaRPr lang="zh-CN" altLang="en-US" sz="1400" dirty="0"/>
+                      <a:endParaRPr lang="zh-CN" altLang="en-US" sz="1200" dirty="0"/>
                     </a:p>
                   </a:txBody>
                   <a:tcPr anchor="ctr"/>
@@ -11405,14 +11296,14 @@
                     <a:p>
                       <a:pPr algn="ctr"/>
                       <a:r>
-                        <a:rPr lang="en-US" altLang="zh-CN" sz="1400" dirty="0" smtClean="0"/>
+                        <a:rPr lang="en-US" altLang="zh-CN" sz="1200" dirty="0" smtClean="0"/>
                         <a:t>Function</a:t>
                       </a:r>
                       <a:r>
-                        <a:rPr lang="en-US" altLang="zh-CN" sz="1400" baseline="0" dirty="0" smtClean="0"/>
+                        <a:rPr lang="en-US" altLang="zh-CN" sz="1200" baseline="0" dirty="0" smtClean="0"/>
                         <a:t> &amp; if &amp; while</a:t>
                       </a:r>
-                      <a:endParaRPr lang="zh-CN" altLang="en-US" sz="1400" dirty="0"/>
+                      <a:endParaRPr lang="zh-CN" altLang="en-US" sz="1200" dirty="0"/>
                     </a:p>
                   </a:txBody>
                   <a:tcPr anchor="ctr"/>
@@ -11426,7 +11317,7 @@
                     <a:p>
                       <a:pPr algn="ctr" fontAlgn="b"/>
                       <a:r>
-                        <a:rPr lang="en-US" sz="1400" kern="1200" dirty="0">
+                        <a:rPr lang="en-US" sz="1200" kern="1200" dirty="0">
                           <a:solidFill>
                             <a:schemeClr val="tx1"/>
                           </a:solidFill>
@@ -11438,7 +11329,7 @@
                         <a:t>test-</a:t>
                       </a:r>
                       <a:r>
-                        <a:rPr lang="en-US" sz="1400" kern="1200" dirty="0" err="1">
+                        <a:rPr lang="en-US" sz="1200" kern="1200" dirty="0" err="1">
                           <a:solidFill>
                             <a:schemeClr val="tx1"/>
                           </a:solidFill>
@@ -11449,7 +11340,7 @@
                         </a:rPr>
                         <a:t>gcd.g</a:t>
                       </a:r>
-                      <a:endParaRPr lang="en-US" sz="1400" kern="1200" dirty="0">
+                      <a:endParaRPr lang="en-US" sz="1200" kern="1200" dirty="0">
                         <a:solidFill>
                           <a:schemeClr val="tx1"/>
                         </a:solidFill>
@@ -11469,10 +11360,10 @@
                     <a:p>
                       <a:pPr algn="ctr"/>
                       <a:r>
-                        <a:rPr lang="en-US" altLang="zh-CN" sz="1400" dirty="0" smtClean="0"/>
+                        <a:rPr lang="en-US" altLang="zh-CN" sz="1200" dirty="0" smtClean="0"/>
                         <a:t>15</a:t>
                       </a:r>
-                      <a:endParaRPr lang="zh-CN" altLang="en-US" sz="1400" dirty="0"/>
+                      <a:endParaRPr lang="zh-CN" altLang="en-US" sz="1200" dirty="0"/>
                     </a:p>
                   </a:txBody>
                   <a:tcPr anchor="ctr"/>
@@ -11484,7 +11375,7 @@
                     <a:p>
                       <a:pPr algn="ctr" fontAlgn="b"/>
                       <a:r>
-                        <a:rPr lang="en-US" sz="1400" kern="1200">
+                        <a:rPr lang="en-US" sz="1200" kern="1200">
                           <a:solidFill>
                             <a:schemeClr val="tx1"/>
                           </a:solidFill>
@@ -11506,10 +11397,10 @@
                     <a:p>
                       <a:pPr algn="ctr"/>
                       <a:r>
-                        <a:rPr lang="en-US" altLang="zh-CN" sz="1400" dirty="0" smtClean="0"/>
+                        <a:rPr lang="en-US" altLang="zh-CN" sz="1200" dirty="0" smtClean="0"/>
                         <a:t>2</a:t>
                       </a:r>
-                      <a:endParaRPr lang="zh-CN" altLang="en-US" sz="1400" dirty="0"/>
+                      <a:endParaRPr lang="zh-CN" altLang="en-US" sz="1200" dirty="0"/>
                     </a:p>
                   </a:txBody>
                   <a:tcPr anchor="ctr"/>
@@ -11521,10 +11412,10 @@
                     <a:p>
                       <a:pPr algn="ctr"/>
                       <a:r>
-                        <a:rPr lang="en-US" altLang="zh-CN" sz="1400" baseline="0" dirty="0" smtClean="0"/>
+                        <a:rPr lang="en-US" altLang="zh-CN" sz="1200" baseline="0" dirty="0" smtClean="0"/>
                         <a:t>Function &amp; if statement</a:t>
                       </a:r>
-                      <a:endParaRPr lang="zh-CN" altLang="en-US" sz="1400" dirty="0"/>
+                      <a:endParaRPr lang="zh-CN" altLang="en-US" sz="1200" dirty="0"/>
                     </a:p>
                   </a:txBody>
                   <a:tcPr anchor="ctr"/>
@@ -11538,7 +11429,7 @@
                     <a:p>
                       <a:pPr algn="ctr" fontAlgn="b"/>
                       <a:r>
-                        <a:rPr lang="en-US" sz="1400" kern="1200" dirty="0">
+                        <a:rPr lang="en-US" sz="1200" kern="1200" dirty="0">
                           <a:solidFill>
                             <a:schemeClr val="tx1"/>
                           </a:solidFill>
@@ -11550,7 +11441,7 @@
                         <a:t>test-</a:t>
                       </a:r>
                       <a:r>
-                        <a:rPr lang="en-US" sz="1400" kern="1200" dirty="0" err="1">
+                        <a:rPr lang="en-US" sz="1200" kern="1200" dirty="0" err="1">
                           <a:solidFill>
                             <a:schemeClr val="tx1"/>
                           </a:solidFill>
@@ -11561,7 +11452,7 @@
                         </a:rPr>
                         <a:t>if.g</a:t>
                       </a:r>
-                      <a:endParaRPr lang="en-US" sz="1400" kern="1200" dirty="0">
+                      <a:endParaRPr lang="en-US" sz="1200" kern="1200" dirty="0">
                         <a:solidFill>
                           <a:schemeClr val="tx1"/>
                         </a:solidFill>
@@ -11581,10 +11472,10 @@
                     <a:p>
                       <a:pPr algn="ctr"/>
                       <a:r>
-                        <a:rPr lang="en-US" altLang="zh-CN" sz="1400" dirty="0" smtClean="0"/>
+                        <a:rPr lang="en-US" altLang="zh-CN" sz="1200" dirty="0" smtClean="0"/>
                         <a:t>11</a:t>
                       </a:r>
-                      <a:endParaRPr lang="zh-CN" altLang="en-US" sz="1400" dirty="0"/>
+                      <a:endParaRPr lang="zh-CN" altLang="en-US" sz="1200" dirty="0"/>
                     </a:p>
                   </a:txBody>
                   <a:tcPr anchor="ctr"/>
@@ -11596,7 +11487,7 @@
                     <a:p>
                       <a:pPr algn="ctr" fontAlgn="b"/>
                       <a:r>
-                        <a:rPr lang="en-US" sz="1400" kern="1200" dirty="0">
+                        <a:rPr lang="en-US" sz="1200" kern="1200" dirty="0">
                           <a:solidFill>
                             <a:schemeClr val="tx1"/>
                           </a:solidFill>
@@ -11608,7 +11499,7 @@
                         <a:t>test-</a:t>
                       </a:r>
                       <a:r>
-                        <a:rPr lang="en-US" sz="1400" kern="1200" dirty="0" err="1">
+                        <a:rPr lang="en-US" sz="1200" kern="1200" dirty="0" err="1">
                           <a:solidFill>
                             <a:schemeClr val="tx1"/>
                           </a:solidFill>
@@ -11619,7 +11510,7 @@
                         </a:rPr>
                         <a:t>if.ref</a:t>
                       </a:r>
-                      <a:endParaRPr lang="en-US" sz="1400" kern="1200" dirty="0">
+                      <a:endParaRPr lang="en-US" sz="1200" kern="1200" dirty="0">
                         <a:solidFill>
                           <a:schemeClr val="tx1"/>
                         </a:solidFill>
@@ -11639,10 +11530,10 @@
                     <a:p>
                       <a:pPr algn="ctr"/>
                       <a:r>
-                        <a:rPr lang="en-US" altLang="zh-CN" sz="1400" dirty="0" smtClean="0"/>
+                        <a:rPr lang="en-US" altLang="zh-CN" sz="1200" dirty="0" smtClean="0"/>
                         <a:t>1</a:t>
                       </a:r>
-                      <a:endParaRPr lang="zh-CN" altLang="en-US" sz="1400" dirty="0"/>
+                      <a:endParaRPr lang="zh-CN" altLang="en-US" sz="1200" dirty="0"/>
                     </a:p>
                   </a:txBody>
                   <a:tcPr anchor="ctr"/>
@@ -11654,10 +11545,10 @@
                     <a:p>
                       <a:pPr algn="ctr"/>
                       <a:r>
-                        <a:rPr lang="en-US" altLang="zh-CN" sz="1400" dirty="0" smtClean="0"/>
+                        <a:rPr lang="en-US" altLang="zh-CN" sz="1200" dirty="0" smtClean="0"/>
                         <a:t>If statements (nested)</a:t>
                       </a:r>
-                      <a:endParaRPr lang="zh-CN" altLang="en-US" sz="1400" dirty="0"/>
+                      <a:endParaRPr lang="zh-CN" altLang="en-US" sz="1200" dirty="0"/>
                     </a:p>
                   </a:txBody>
                   <a:tcPr anchor="ctr"/>
@@ -11671,7 +11562,7 @@
                     <a:p>
                       <a:pPr algn="ctr" fontAlgn="b"/>
                       <a:r>
-                        <a:rPr lang="en-US" sz="1400" kern="1200" dirty="0">
+                        <a:rPr lang="en-US" sz="1200" kern="1200" dirty="0">
                           <a:solidFill>
                             <a:schemeClr val="tx1"/>
                           </a:solidFill>
@@ -11683,7 +11574,7 @@
                         <a:t>test-</a:t>
                       </a:r>
                       <a:r>
-                        <a:rPr lang="en-US" sz="1400" kern="1200" dirty="0" err="1">
+                        <a:rPr lang="en-US" sz="1200" kern="1200" dirty="0" err="1">
                           <a:solidFill>
                             <a:schemeClr val="tx1"/>
                           </a:solidFill>
@@ -11694,7 +11585,7 @@
                         </a:rPr>
                         <a:t>line.g</a:t>
                       </a:r>
-                      <a:endParaRPr lang="en-US" sz="1400" kern="1200" dirty="0">
+                      <a:endParaRPr lang="en-US" sz="1200" kern="1200" dirty="0">
                         <a:solidFill>
                           <a:schemeClr val="tx1"/>
                         </a:solidFill>
@@ -11714,10 +11605,10 @@
                     <a:p>
                       <a:pPr algn="ctr"/>
                       <a:r>
-                        <a:rPr lang="en-US" altLang="zh-CN" sz="1400" dirty="0" smtClean="0"/>
+                        <a:rPr lang="en-US" altLang="zh-CN" sz="1200" dirty="0" smtClean="0"/>
                         <a:t>35</a:t>
                       </a:r>
-                      <a:endParaRPr lang="zh-CN" altLang="en-US" sz="1400" dirty="0"/>
+                      <a:endParaRPr lang="zh-CN" altLang="en-US" sz="1200" dirty="0"/>
                     </a:p>
                   </a:txBody>
                   <a:tcPr anchor="ctr"/>
@@ -11729,7 +11620,7 @@
                     <a:p>
                       <a:pPr algn="ctr" fontAlgn="b"/>
                       <a:r>
-                        <a:rPr lang="en-US" sz="1400" kern="1200" dirty="0">
+                        <a:rPr lang="en-US" sz="1200" kern="1200" dirty="0">
                           <a:solidFill>
                             <a:schemeClr val="tx1"/>
                           </a:solidFill>
@@ -11741,7 +11632,7 @@
                         <a:t>test-</a:t>
                       </a:r>
                       <a:r>
-                        <a:rPr lang="en-US" sz="1400" kern="1200" dirty="0" err="1">
+                        <a:rPr lang="en-US" sz="1200" kern="1200" dirty="0" err="1">
                           <a:solidFill>
                             <a:schemeClr val="tx1"/>
                           </a:solidFill>
@@ -11752,7 +11643,7 @@
                         </a:rPr>
                         <a:t>line.ref</a:t>
                       </a:r>
-                      <a:endParaRPr lang="en-US" sz="1400" kern="1200" dirty="0">
+                      <a:endParaRPr lang="en-US" sz="1200" kern="1200" dirty="0">
                         <a:solidFill>
                           <a:schemeClr val="tx1"/>
                         </a:solidFill>
@@ -11772,10 +11663,10 @@
                     <a:p>
                       <a:pPr algn="ctr"/>
                       <a:r>
-                        <a:rPr lang="en-US" altLang="zh-CN" sz="1400" dirty="0" smtClean="0"/>
+                        <a:rPr lang="en-US" altLang="zh-CN" sz="1200" dirty="0" smtClean="0"/>
                         <a:t>15</a:t>
                       </a:r>
-                      <a:endParaRPr lang="zh-CN" altLang="en-US" sz="1400" dirty="0"/>
+                      <a:endParaRPr lang="zh-CN" altLang="en-US" sz="1200" dirty="0"/>
                     </a:p>
                   </a:txBody>
                   <a:tcPr anchor="ctr"/>
@@ -11787,22 +11678,22 @@
                     <a:p>
                       <a:pPr algn="ctr"/>
                       <a:r>
-                        <a:rPr lang="en-US" altLang="zh-CN" sz="1400" dirty="0" smtClean="0"/>
+                        <a:rPr lang="en-US" altLang="zh-CN" sz="1200" dirty="0" smtClean="0"/>
                         <a:t>Geo type line &amp; </a:t>
                       </a:r>
                       <a:r>
-                        <a:rPr lang="en-US" altLang="zh-CN" sz="1400" dirty="0" err="1" smtClean="0"/>
+                        <a:rPr lang="en-US" altLang="zh-CN" sz="1200" dirty="0" err="1" smtClean="0"/>
                         <a:t>obj</a:t>
                       </a:r>
                       <a:r>
-                        <a:rPr lang="en-US" altLang="zh-CN" sz="1400" baseline="0" dirty="0" smtClean="0"/>
+                        <a:rPr lang="en-US" altLang="zh-CN" sz="1200" baseline="0" dirty="0" smtClean="0"/>
                         <a:t> </a:t>
                       </a:r>
                       <a:r>
-                        <a:rPr lang="en-US" altLang="zh-CN" sz="1400" baseline="0" dirty="0" err="1" smtClean="0"/>
+                        <a:rPr lang="en-US" altLang="zh-CN" sz="1200" baseline="0" dirty="0" err="1" smtClean="0"/>
                         <a:t>funcs</a:t>
                       </a:r>
-                      <a:endParaRPr lang="zh-CN" altLang="en-US" sz="1400" dirty="0"/>
+                      <a:endParaRPr lang="zh-CN" altLang="en-US" sz="1200" dirty="0"/>
                     </a:p>
                   </a:txBody>
                   <a:tcPr anchor="ctr"/>
@@ -11816,7 +11707,7 @@
                     <a:p>
                       <a:pPr algn="ctr" fontAlgn="b"/>
                       <a:r>
-                        <a:rPr lang="en-US" sz="1400" kern="1200" dirty="0">
+                        <a:rPr lang="en-US" sz="1200" kern="1200" dirty="0">
                           <a:solidFill>
                             <a:schemeClr val="tx1"/>
                           </a:solidFill>
@@ -11828,7 +11719,7 @@
                         <a:t>test-</a:t>
                       </a:r>
                       <a:r>
-                        <a:rPr lang="en-US" sz="1400" kern="1200" dirty="0" err="1">
+                        <a:rPr lang="en-US" sz="1200" kern="1200" dirty="0" err="1">
                           <a:solidFill>
                             <a:schemeClr val="tx1"/>
                           </a:solidFill>
@@ -11839,7 +11730,7 @@
                         </a:rPr>
                         <a:t>list.g</a:t>
                       </a:r>
-                      <a:endParaRPr lang="en-US" sz="1400" kern="1200" dirty="0">
+                      <a:endParaRPr lang="en-US" sz="1200" kern="1200" dirty="0">
                         <a:solidFill>
                           <a:schemeClr val="tx1"/>
                         </a:solidFill>
@@ -11859,10 +11750,10 @@
                     <a:p>
                       <a:pPr algn="ctr"/>
                       <a:r>
-                        <a:rPr lang="en-US" altLang="zh-CN" sz="1400" dirty="0" smtClean="0"/>
+                        <a:rPr lang="en-US" altLang="zh-CN" sz="1200" dirty="0" smtClean="0"/>
                         <a:t>8</a:t>
                       </a:r>
-                      <a:endParaRPr lang="zh-CN" altLang="en-US" sz="1400" dirty="0"/>
+                      <a:endParaRPr lang="zh-CN" altLang="en-US" sz="1200" dirty="0"/>
                     </a:p>
                   </a:txBody>
                   <a:tcPr anchor="ctr"/>
@@ -11874,7 +11765,7 @@
                     <a:p>
                       <a:pPr algn="ctr" fontAlgn="b"/>
                       <a:r>
-                        <a:rPr lang="en-US" sz="1400" kern="1200" dirty="0">
+                        <a:rPr lang="en-US" sz="1200" kern="1200" dirty="0">
                           <a:solidFill>
                             <a:schemeClr val="tx1"/>
                           </a:solidFill>
@@ -11886,7 +11777,7 @@
                         <a:t>test-</a:t>
                       </a:r>
                       <a:r>
-                        <a:rPr lang="en-US" sz="1400" kern="1200" dirty="0" err="1">
+                        <a:rPr lang="en-US" sz="1200" kern="1200" dirty="0" err="1">
                           <a:solidFill>
                             <a:schemeClr val="tx1"/>
                           </a:solidFill>
@@ -11897,7 +11788,7 @@
                         </a:rPr>
                         <a:t>list.ref</a:t>
                       </a:r>
-                      <a:endParaRPr lang="en-US" sz="1400" kern="1200" dirty="0">
+                      <a:endParaRPr lang="en-US" sz="1200" kern="1200" dirty="0">
                         <a:solidFill>
                           <a:schemeClr val="tx1"/>
                         </a:solidFill>
@@ -11917,10 +11808,10 @@
                     <a:p>
                       <a:pPr algn="ctr"/>
                       <a:r>
-                        <a:rPr lang="en-US" altLang="zh-CN" sz="1400" dirty="0" smtClean="0"/>
+                        <a:rPr lang="en-US" altLang="zh-CN" sz="1200" dirty="0" smtClean="0"/>
                         <a:t>4</a:t>
                       </a:r>
-                      <a:endParaRPr lang="zh-CN" altLang="en-US" sz="1400" dirty="0"/>
+                      <a:endParaRPr lang="zh-CN" altLang="en-US" sz="1200" dirty="0"/>
                     </a:p>
                   </a:txBody>
                   <a:tcPr anchor="ctr"/>
@@ -11932,10 +11823,10 @@
                     <a:p>
                       <a:pPr algn="ctr"/>
                       <a:r>
-                        <a:rPr lang="en-US" altLang="zh-CN" sz="1400" dirty="0" smtClean="0"/>
+                        <a:rPr lang="en-US" altLang="zh-CN" sz="1200" dirty="0" smtClean="0"/>
                         <a:t>List</a:t>
                       </a:r>
-                      <a:endParaRPr lang="zh-CN" altLang="en-US" sz="1400" dirty="0"/>
+                      <a:endParaRPr lang="zh-CN" altLang="en-US" sz="1200" dirty="0"/>
                     </a:p>
                   </a:txBody>
                   <a:tcPr anchor="ctr"/>
@@ -11949,7 +11840,7 @@
                     <a:p>
                       <a:pPr algn="ctr" fontAlgn="b"/>
                       <a:r>
-                        <a:rPr lang="en-US" sz="1400" kern="1200" dirty="0">
+                        <a:rPr lang="en-US" sz="1200" kern="1200" dirty="0">
                           <a:solidFill>
                             <a:schemeClr val="tx1"/>
                           </a:solidFill>
@@ -11961,7 +11852,7 @@
                         <a:t>test-</a:t>
                       </a:r>
                       <a:r>
-                        <a:rPr lang="en-US" sz="1400" kern="1200" dirty="0" err="1">
+                        <a:rPr lang="en-US" sz="1200" kern="1200" dirty="0" err="1">
                           <a:solidFill>
                             <a:schemeClr val="tx1"/>
                           </a:solidFill>
@@ -11972,7 +11863,7 @@
                         </a:rPr>
                         <a:t>operations.g</a:t>
                       </a:r>
-                      <a:endParaRPr lang="en-US" sz="1400" kern="1200" dirty="0">
+                      <a:endParaRPr lang="en-US" sz="1200" kern="1200" dirty="0">
                         <a:solidFill>
                           <a:schemeClr val="tx1"/>
                         </a:solidFill>
@@ -11992,10 +11883,10 @@
                     <a:p>
                       <a:pPr algn="ctr"/>
                       <a:r>
-                        <a:rPr lang="en-US" altLang="zh-CN" sz="1400" dirty="0" smtClean="0"/>
+                        <a:rPr lang="en-US" altLang="zh-CN" sz="1200" dirty="0" smtClean="0"/>
                         <a:t>20</a:t>
                       </a:r>
-                      <a:endParaRPr lang="zh-CN" altLang="en-US" sz="1400" dirty="0"/>
+                      <a:endParaRPr lang="zh-CN" altLang="en-US" sz="1200" dirty="0"/>
                     </a:p>
                   </a:txBody>
                   <a:tcPr anchor="ctr"/>
@@ -12007,7 +11898,7 @@
                     <a:p>
                       <a:pPr algn="ctr" fontAlgn="b"/>
                       <a:r>
-                        <a:rPr lang="en-US" sz="1400" kern="1200" dirty="0">
+                        <a:rPr lang="en-US" sz="1200" kern="1200" dirty="0">
                           <a:solidFill>
                             <a:schemeClr val="tx1"/>
                           </a:solidFill>
@@ -12019,7 +11910,7 @@
                         <a:t>test-</a:t>
                       </a:r>
                       <a:r>
-                        <a:rPr lang="en-US" sz="1400" kern="1200" dirty="0" err="1">
+                        <a:rPr lang="en-US" sz="1200" kern="1200" dirty="0" err="1">
                           <a:solidFill>
                             <a:schemeClr val="tx1"/>
                           </a:solidFill>
@@ -12030,7 +11921,7 @@
                         </a:rPr>
                         <a:t>operations.ref</a:t>
                       </a:r>
-                      <a:endParaRPr lang="en-US" sz="1400" kern="1200" dirty="0">
+                      <a:endParaRPr lang="en-US" sz="1200" kern="1200" dirty="0">
                         <a:solidFill>
                           <a:schemeClr val="tx1"/>
                         </a:solidFill>
@@ -12050,10 +11941,10 @@
                     <a:p>
                       <a:pPr algn="ctr"/>
                       <a:r>
-                        <a:rPr lang="en-US" altLang="zh-CN" sz="1400" dirty="0" smtClean="0"/>
+                        <a:rPr lang="en-US" altLang="zh-CN" sz="1200" dirty="0" smtClean="0"/>
                         <a:t>9</a:t>
                       </a:r>
-                      <a:endParaRPr lang="zh-CN" altLang="en-US" sz="1400" dirty="0"/>
+                      <a:endParaRPr lang="zh-CN" altLang="en-US" sz="1200" dirty="0"/>
                     </a:p>
                   </a:txBody>
                   <a:tcPr anchor="ctr"/>
@@ -12065,18 +11956,18 @@
                     <a:p>
                       <a:pPr algn="ctr"/>
                       <a:r>
-                        <a:rPr lang="en-US" altLang="zh-CN" sz="1400" dirty="0" smtClean="0"/>
+                        <a:rPr lang="en-US" altLang="zh-CN" sz="1200" dirty="0" smtClean="0"/>
                         <a:t>Check</a:t>
                       </a:r>
                       <a:r>
-                        <a:rPr lang="en-US" altLang="zh-CN" sz="1400" baseline="0" dirty="0" smtClean="0"/>
+                        <a:rPr lang="en-US" altLang="zh-CN" sz="1200" baseline="0" dirty="0" smtClean="0"/>
                         <a:t> +-*/^% </a:t>
                       </a:r>
                       <a:r>
-                        <a:rPr lang="en-US" altLang="zh-CN" sz="1400" baseline="0" dirty="0" err="1" smtClean="0"/>
+                        <a:rPr lang="en-US" altLang="zh-CN" sz="1200" baseline="0" dirty="0" err="1" smtClean="0"/>
                         <a:t>opertations</a:t>
                       </a:r>
-                      <a:endParaRPr lang="zh-CN" altLang="en-US" sz="1400" dirty="0"/>
+                      <a:endParaRPr lang="zh-CN" altLang="en-US" sz="1200" dirty="0"/>
                     </a:p>
                   </a:txBody>
                   <a:tcPr anchor="ctr"/>
@@ -12090,7 +11981,7 @@
                     <a:p>
                       <a:pPr algn="ctr" fontAlgn="b"/>
                       <a:r>
-                        <a:rPr lang="en-US" sz="1400" kern="1200" dirty="0">
+                        <a:rPr lang="en-US" sz="1200" kern="1200" dirty="0">
                           <a:solidFill>
                             <a:schemeClr val="tx1"/>
                           </a:solidFill>
@@ -12102,7 +11993,7 @@
                         <a:t>test-</a:t>
                       </a:r>
                       <a:r>
-                        <a:rPr lang="en-US" sz="1400" kern="1200" dirty="0" err="1">
+                        <a:rPr lang="en-US" sz="1200" kern="1200" dirty="0" err="1">
                           <a:solidFill>
                             <a:schemeClr val="tx1"/>
                           </a:solidFill>
@@ -12113,7 +12004,7 @@
                         </a:rPr>
                         <a:t>polygon.g</a:t>
                       </a:r>
-                      <a:endParaRPr lang="en-US" sz="1400" kern="1200" dirty="0">
+                      <a:endParaRPr lang="en-US" sz="1200" kern="1200" dirty="0">
                         <a:solidFill>
                           <a:schemeClr val="tx1"/>
                         </a:solidFill>
@@ -12133,10 +12024,10 @@
                     <a:p>
                       <a:pPr algn="ctr"/>
                       <a:r>
-                        <a:rPr lang="en-US" altLang="zh-CN" sz="1400" dirty="0" smtClean="0"/>
+                        <a:rPr lang="en-US" altLang="zh-CN" sz="1200" dirty="0" smtClean="0"/>
                         <a:t>20</a:t>
                       </a:r>
-                      <a:endParaRPr lang="zh-CN" altLang="en-US" sz="1400" dirty="0"/>
+                      <a:endParaRPr lang="zh-CN" altLang="en-US" sz="1200" dirty="0"/>
                     </a:p>
                   </a:txBody>
                   <a:tcPr anchor="ctr"/>
@@ -12148,7 +12039,7 @@
                     <a:p>
                       <a:pPr algn="ctr" fontAlgn="b"/>
                       <a:r>
-                        <a:rPr lang="en-US" sz="1400" kern="1200" dirty="0">
+                        <a:rPr lang="en-US" sz="1200" kern="1200" dirty="0">
                           <a:solidFill>
                             <a:schemeClr val="tx1"/>
                           </a:solidFill>
@@ -12160,7 +12051,7 @@
                         <a:t>test-</a:t>
                       </a:r>
                       <a:r>
-                        <a:rPr lang="en-US" sz="1400" kern="1200" dirty="0" err="1">
+                        <a:rPr lang="en-US" sz="1200" kern="1200" dirty="0" err="1">
                           <a:solidFill>
                             <a:schemeClr val="tx1"/>
                           </a:solidFill>
@@ -12171,7 +12062,7 @@
                         </a:rPr>
                         <a:t>polygon.ref</a:t>
                       </a:r>
-                      <a:endParaRPr lang="en-US" sz="1400" kern="1200" dirty="0">
+                      <a:endParaRPr lang="en-US" sz="1200" kern="1200" dirty="0">
                         <a:solidFill>
                           <a:schemeClr val="tx1"/>
                         </a:solidFill>
@@ -12191,10 +12082,10 @@
                     <a:p>
                       <a:pPr algn="ctr"/>
                       <a:r>
-                        <a:rPr lang="en-US" altLang="zh-CN" sz="1400" dirty="0" smtClean="0"/>
+                        <a:rPr lang="en-US" altLang="zh-CN" sz="1200" dirty="0" smtClean="0"/>
                         <a:t>11</a:t>
                       </a:r>
-                      <a:endParaRPr lang="zh-CN" altLang="en-US" sz="1400" dirty="0"/>
+                      <a:endParaRPr lang="zh-CN" altLang="en-US" sz="1200" dirty="0"/>
                     </a:p>
                   </a:txBody>
                   <a:tcPr anchor="ctr"/>
@@ -12206,26 +12097,26 @@
                     <a:p>
                       <a:pPr algn="ctr"/>
                       <a:r>
-                        <a:rPr lang="en-US" altLang="zh-CN" sz="1400" dirty="0" smtClean="0"/>
+                        <a:rPr lang="en-US" altLang="zh-CN" sz="1200" dirty="0" smtClean="0"/>
                         <a:t>Geo type polygon &amp;</a:t>
                       </a:r>
                       <a:r>
-                        <a:rPr lang="en-US" altLang="zh-CN" sz="1400" baseline="0" dirty="0" smtClean="0"/>
+                        <a:rPr lang="en-US" altLang="zh-CN" sz="1200" baseline="0" dirty="0" smtClean="0"/>
                         <a:t> </a:t>
                       </a:r>
                       <a:r>
-                        <a:rPr lang="en-US" altLang="zh-CN" sz="1400" baseline="0" dirty="0" err="1" smtClean="0"/>
+                        <a:rPr lang="en-US" altLang="zh-CN" sz="1200" baseline="0" dirty="0" err="1" smtClean="0"/>
                         <a:t>obj</a:t>
                       </a:r>
                       <a:r>
-                        <a:rPr lang="en-US" altLang="zh-CN" sz="1400" baseline="0" dirty="0" smtClean="0"/>
+                        <a:rPr lang="en-US" altLang="zh-CN" sz="1200" baseline="0" dirty="0" smtClean="0"/>
                         <a:t> </a:t>
                       </a:r>
                       <a:r>
-                        <a:rPr lang="en-US" altLang="zh-CN" sz="1400" baseline="0" dirty="0" err="1" smtClean="0"/>
+                        <a:rPr lang="en-US" altLang="zh-CN" sz="1200" baseline="0" dirty="0" err="1" smtClean="0"/>
                         <a:t>funcs</a:t>
                       </a:r>
-                      <a:endParaRPr lang="zh-CN" altLang="en-US" sz="1400" dirty="0"/>
+                      <a:endParaRPr lang="zh-CN" altLang="en-US" sz="1200" dirty="0"/>
                     </a:p>
                   </a:txBody>
                   <a:tcPr anchor="ctr"/>
@@ -12239,7 +12130,7 @@
                     <a:p>
                       <a:pPr algn="ctr" fontAlgn="b"/>
                       <a:r>
-                        <a:rPr lang="en-US" sz="1400" kern="1200" dirty="0">
+                        <a:rPr lang="en-US" sz="1200" kern="1200" dirty="0">
                           <a:solidFill>
                             <a:schemeClr val="tx1"/>
                           </a:solidFill>
@@ -12251,7 +12142,7 @@
                         <a:t>test-</a:t>
                       </a:r>
                       <a:r>
-                        <a:rPr lang="en-US" sz="1400" kern="1200" dirty="0" err="1">
+                        <a:rPr lang="en-US" sz="1200" kern="1200" dirty="0" err="1">
                           <a:solidFill>
                             <a:schemeClr val="tx1"/>
                           </a:solidFill>
@@ -12262,7 +12153,7 @@
                         </a:rPr>
                         <a:t>print.g</a:t>
                       </a:r>
-                      <a:endParaRPr lang="en-US" sz="1400" kern="1200" dirty="0">
+                      <a:endParaRPr lang="en-US" sz="1200" kern="1200" dirty="0">
                         <a:solidFill>
                           <a:schemeClr val="tx1"/>
                         </a:solidFill>
@@ -12282,10 +12173,10 @@
                     <a:p>
                       <a:pPr algn="ctr"/>
                       <a:r>
-                        <a:rPr lang="en-US" altLang="zh-CN" sz="1400" dirty="0" smtClean="0"/>
+                        <a:rPr lang="en-US" altLang="zh-CN" sz="1200" dirty="0" smtClean="0"/>
                         <a:t>10</a:t>
                       </a:r>
-                      <a:endParaRPr lang="zh-CN" altLang="en-US" sz="1400" dirty="0"/>
+                      <a:endParaRPr lang="zh-CN" altLang="en-US" sz="1200" dirty="0"/>
                     </a:p>
                   </a:txBody>
                   <a:tcPr anchor="ctr"/>
@@ -12297,7 +12188,7 @@
                     <a:p>
                       <a:pPr algn="ctr" fontAlgn="b"/>
                       <a:r>
-                        <a:rPr lang="en-US" sz="1400" kern="1200" dirty="0">
+                        <a:rPr lang="en-US" sz="1200" kern="1200" dirty="0">
                           <a:solidFill>
                             <a:schemeClr val="tx1"/>
                           </a:solidFill>
@@ -12309,7 +12200,7 @@
                         <a:t>test-</a:t>
                       </a:r>
                       <a:r>
-                        <a:rPr lang="en-US" sz="1400" kern="1200" dirty="0" err="1">
+                        <a:rPr lang="en-US" sz="1200" kern="1200" dirty="0" err="1">
                           <a:solidFill>
                             <a:schemeClr val="tx1"/>
                           </a:solidFill>
@@ -12320,7 +12211,7 @@
                         </a:rPr>
                         <a:t>print.ref</a:t>
                       </a:r>
-                      <a:endParaRPr lang="en-US" sz="1400" kern="1200" dirty="0">
+                      <a:endParaRPr lang="en-US" sz="1200" kern="1200" dirty="0">
                         <a:solidFill>
                           <a:schemeClr val="tx1"/>
                         </a:solidFill>
@@ -12340,10 +12231,10 @@
                     <a:p>
                       <a:pPr algn="ctr"/>
                       <a:r>
-                        <a:rPr lang="en-US" altLang="zh-CN" sz="1400" dirty="0" smtClean="0"/>
+                        <a:rPr lang="en-US" altLang="zh-CN" sz="1200" dirty="0" smtClean="0"/>
                         <a:t>8</a:t>
                       </a:r>
-                      <a:endParaRPr lang="zh-CN" altLang="en-US" sz="1400" dirty="0"/>
+                      <a:endParaRPr lang="zh-CN" altLang="en-US" sz="1200" dirty="0"/>
                     </a:p>
                   </a:txBody>
                   <a:tcPr anchor="ctr"/>
@@ -12355,10 +12246,10 @@
                     <a:p>
                       <a:pPr algn="ctr"/>
                       <a:r>
-                        <a:rPr lang="en-US" altLang="zh-CN" sz="1400" dirty="0" smtClean="0"/>
+                        <a:rPr lang="en-US" altLang="zh-CN" sz="1200" dirty="0" smtClean="0"/>
                         <a:t>Print function</a:t>
                       </a:r>
-                      <a:endParaRPr lang="zh-CN" altLang="en-US" sz="1400" dirty="0"/>
+                      <a:endParaRPr lang="zh-CN" altLang="en-US" sz="1200" dirty="0"/>
                     </a:p>
                   </a:txBody>
                   <a:tcPr anchor="ctr"/>
@@ -12372,7 +12263,7 @@
                     <a:p>
                       <a:pPr algn="ctr" fontAlgn="b"/>
                       <a:r>
-                        <a:rPr lang="en-US" sz="1400" kern="1200" dirty="0">
+                        <a:rPr lang="en-US" sz="1200" kern="1200" dirty="0">
                           <a:solidFill>
                             <a:schemeClr val="tx1"/>
                           </a:solidFill>
@@ -12384,7 +12275,7 @@
                         <a:t>test-</a:t>
                       </a:r>
                       <a:r>
-                        <a:rPr lang="en-US" sz="1400" kern="1200" dirty="0" err="1">
+                        <a:rPr lang="en-US" sz="1200" kern="1200" dirty="0" err="1">
                           <a:solidFill>
                             <a:schemeClr val="tx1"/>
                           </a:solidFill>
@@ -12395,7 +12286,7 @@
                         </a:rPr>
                         <a:t>qsort.g</a:t>
                       </a:r>
-                      <a:endParaRPr lang="en-US" sz="1400" kern="1200" dirty="0">
+                      <a:endParaRPr lang="en-US" sz="1200" kern="1200" dirty="0">
                         <a:solidFill>
                           <a:schemeClr val="tx1"/>
                         </a:solidFill>
@@ -12415,10 +12306,10 @@
                     <a:p>
                       <a:pPr algn="ctr"/>
                       <a:r>
-                        <a:rPr lang="en-US" altLang="zh-CN" sz="1400" dirty="0" smtClean="0"/>
+                        <a:rPr lang="en-US" altLang="zh-CN" sz="1200" dirty="0" smtClean="0"/>
                         <a:t>35</a:t>
                       </a:r>
-                      <a:endParaRPr lang="zh-CN" altLang="en-US" sz="1400" dirty="0"/>
+                      <a:endParaRPr lang="zh-CN" altLang="en-US" sz="1200" dirty="0"/>
                     </a:p>
                   </a:txBody>
                   <a:tcPr anchor="ctr"/>
@@ -12430,7 +12321,7 @@
                     <a:p>
                       <a:pPr algn="ctr" fontAlgn="b"/>
                       <a:r>
-                        <a:rPr lang="en-US" sz="1400" kern="1200" dirty="0">
+                        <a:rPr lang="en-US" sz="1200" kern="1200" dirty="0">
                           <a:solidFill>
                             <a:schemeClr val="tx1"/>
                           </a:solidFill>
@@ -12442,7 +12333,7 @@
                         <a:t>test-</a:t>
                       </a:r>
                       <a:r>
-                        <a:rPr lang="en-US" sz="1400" kern="1200" dirty="0" err="1">
+                        <a:rPr lang="en-US" sz="1200" kern="1200" dirty="0" err="1">
                           <a:solidFill>
                             <a:schemeClr val="tx1"/>
                           </a:solidFill>
@@ -12453,7 +12344,7 @@
                         </a:rPr>
                         <a:t>qsort.ref</a:t>
                       </a:r>
-                      <a:endParaRPr lang="en-US" sz="1400" kern="1200" dirty="0">
+                      <a:endParaRPr lang="en-US" sz="1200" kern="1200" dirty="0">
                         <a:solidFill>
                           <a:schemeClr val="tx1"/>
                         </a:solidFill>
@@ -12473,10 +12364,10 @@
                     <a:p>
                       <a:pPr algn="ctr"/>
                       <a:r>
-                        <a:rPr lang="en-US" altLang="zh-CN" sz="1400" dirty="0" smtClean="0"/>
+                        <a:rPr lang="en-US" altLang="zh-CN" sz="1200" dirty="0" smtClean="0"/>
                         <a:t>1</a:t>
                       </a:r>
-                      <a:endParaRPr lang="zh-CN" altLang="en-US" sz="1400" dirty="0"/>
+                      <a:endParaRPr lang="zh-CN" altLang="en-US" sz="1200" dirty="0"/>
                     </a:p>
                   </a:txBody>
                   <a:tcPr anchor="ctr"/>
@@ -12488,10 +12379,10 @@
                     <a:p>
                       <a:pPr algn="ctr"/>
                       <a:r>
-                        <a:rPr lang="en-US" altLang="zh-CN" sz="1400" dirty="0" smtClean="0"/>
+                        <a:rPr lang="en-US" altLang="zh-CN" sz="1200" dirty="0" smtClean="0"/>
                         <a:t>List &amp; recursive function</a:t>
                       </a:r>
-                      <a:endParaRPr lang="zh-CN" altLang="en-US" sz="1400" dirty="0"/>
+                      <a:endParaRPr lang="zh-CN" altLang="en-US" sz="1200" dirty="0"/>
                     </a:p>
                   </a:txBody>
                   <a:tcPr anchor="ctr"/>
@@ -12505,7 +12396,7 @@
                     <a:p>
                       <a:pPr algn="ctr" fontAlgn="b"/>
                       <a:r>
-                        <a:rPr lang="en-US" sz="1400" kern="1200" dirty="0">
+                        <a:rPr lang="en-US" sz="1200" kern="1200" dirty="0">
                           <a:solidFill>
                             <a:schemeClr val="tx1"/>
                           </a:solidFill>
@@ -12517,7 +12408,7 @@
                         <a:t>test-</a:t>
                       </a:r>
                       <a:r>
-                        <a:rPr lang="en-US" sz="1400" kern="1200" dirty="0" err="1">
+                        <a:rPr lang="en-US" sz="1200" kern="1200" dirty="0" err="1">
                           <a:solidFill>
                             <a:schemeClr val="tx1"/>
                           </a:solidFill>
@@ -12528,7 +12419,7 @@
                         </a:rPr>
                         <a:t>while.g</a:t>
                       </a:r>
-                      <a:endParaRPr lang="en-US" sz="1400" kern="1200" dirty="0">
+                      <a:endParaRPr lang="en-US" sz="1200" kern="1200" dirty="0">
                         <a:solidFill>
                           <a:schemeClr val="tx1"/>
                         </a:solidFill>
@@ -12548,10 +12439,10 @@
                     <a:p>
                       <a:pPr algn="ctr"/>
                       <a:r>
-                        <a:rPr lang="en-US" altLang="zh-CN" sz="1400" dirty="0" smtClean="0"/>
+                        <a:rPr lang="en-US" altLang="zh-CN" sz="1200" dirty="0" smtClean="0"/>
                         <a:t>7</a:t>
                       </a:r>
-                      <a:endParaRPr lang="zh-CN" altLang="en-US" sz="1400" dirty="0"/>
+                      <a:endParaRPr lang="zh-CN" altLang="en-US" sz="1200" dirty="0"/>
                     </a:p>
                   </a:txBody>
                   <a:tcPr anchor="ctr"/>
@@ -12563,7 +12454,7 @@
                     <a:p>
                       <a:pPr algn="ctr" fontAlgn="b"/>
                       <a:r>
-                        <a:rPr lang="en-US" sz="1400" kern="1200" dirty="0">
+                        <a:rPr lang="en-US" sz="1200" kern="1200" dirty="0">
                           <a:solidFill>
                             <a:schemeClr val="tx1"/>
                           </a:solidFill>
@@ -12575,7 +12466,7 @@
                         <a:t>test-</a:t>
                       </a:r>
                       <a:r>
-                        <a:rPr lang="en-US" sz="1400" kern="1200" dirty="0" err="1">
+                        <a:rPr lang="en-US" sz="1200" kern="1200" dirty="0" err="1">
                           <a:solidFill>
                             <a:schemeClr val="tx1"/>
                           </a:solidFill>
@@ -12586,7 +12477,7 @@
                         </a:rPr>
                         <a:t>while.ref</a:t>
                       </a:r>
-                      <a:endParaRPr lang="en-US" sz="1400" kern="1200" dirty="0">
+                      <a:endParaRPr lang="en-US" sz="1200" kern="1200" dirty="0">
                         <a:solidFill>
                           <a:schemeClr val="tx1"/>
                         </a:solidFill>
@@ -12606,10 +12497,10 @@
                     <a:p>
                       <a:pPr algn="ctr"/>
                       <a:r>
-                        <a:rPr lang="en-US" altLang="zh-CN" sz="1400" dirty="0" smtClean="0"/>
+                        <a:rPr lang="en-US" altLang="zh-CN" sz="1200" dirty="0" smtClean="0"/>
                         <a:t>6</a:t>
                       </a:r>
-                      <a:endParaRPr lang="zh-CN" altLang="en-US" sz="1400" dirty="0"/>
+                      <a:endParaRPr lang="zh-CN" altLang="en-US" sz="1200" dirty="0"/>
                     </a:p>
                   </a:txBody>
                   <a:tcPr anchor="ctr"/>
@@ -12621,14 +12512,14 @@
                     <a:p>
                       <a:pPr algn="ctr"/>
                       <a:r>
-                        <a:rPr lang="en-US" altLang="zh-CN" sz="1400" dirty="0" smtClean="0"/>
+                        <a:rPr lang="en-US" altLang="zh-CN" sz="1200" dirty="0" smtClean="0"/>
                         <a:t>While</a:t>
                       </a:r>
                       <a:r>
-                        <a:rPr lang="en-US" altLang="zh-CN" sz="1400" baseline="0" dirty="0" smtClean="0"/>
+                        <a:rPr lang="en-US" altLang="zh-CN" sz="1200" baseline="0" dirty="0" smtClean="0"/>
                         <a:t> statement</a:t>
                       </a:r>
-                      <a:endParaRPr lang="zh-CN" altLang="en-US" sz="1400" dirty="0"/>
+                      <a:endParaRPr lang="zh-CN" altLang="en-US" sz="1200" dirty="0"/>
                     </a:p>
                   </a:txBody>
                   <a:tcPr anchor="ctr"/>
@@ -12641,7 +12532,7 @@
     </p:spTree>
     <p:extLst>
       <p:ext uri="{BB962C8B-B14F-4D97-AF65-F5344CB8AC3E}">
-        <p14:creationId xmlns:p14="http://schemas.microsoft.com/office/powerpoint/2010/main" val="1454580282"/>
+        <p14:creationId xmlns:p14="http://schemas.microsoft.com/office/powerpoint/2010/main" val="1323626890"/>
       </p:ext>
     </p:extLst>
   </p:cSld>
@@ -12651,14 +12542,14 @@
   <p:timing>
     <p:tnLst>
       <p:par>
-        <p:cTn id="1" dur="indefinite" restart="never" nodeType="tmRoot"/>
+        <p:cTn xmlns:p14="http://schemas.microsoft.com/office/powerpoint/2010/main" id="1" dur="indefinite" restart="never" nodeType="tmRoot"/>
       </p:par>
     </p:tnLst>
   </p:timing>
 </p:sld>
 </file>
 
-<file path=ppt/slides/slide14.xml><?xml version="1.0" encoding="utf-8"?>
+<file path=ppt/slides/slide13.xml><?xml version="1.0" encoding="utf-8"?>
 <p:sld xmlns:a="http://schemas.openxmlformats.org/drawingml/2006/main" xmlns:r="http://schemas.openxmlformats.org/officeDocument/2006/relationships" xmlns:p="http://schemas.openxmlformats.org/presentationml/2006/main">
   <p:cSld>
     <p:spTree>
@@ -12745,7 +12636,7 @@
           <p:nvPr>
             <p:extLst>
               <p:ext uri="{D42A27DB-BD31-4B8C-83A1-F6EECF244321}">
-                <p14:modId xmlns:p14="http://schemas.microsoft.com/office/powerpoint/2010/main" val="1984048626"/>
+                <p14:modId xmlns:p14="http://schemas.microsoft.com/office/powerpoint/2010/main" val="3963884560"/>
               </p:ext>
             </p:extLst>
           </p:nvPr>
@@ -13424,7 +13315,7 @@
     </p:spTree>
     <p:extLst>
       <p:ext uri="{BB962C8B-B14F-4D97-AF65-F5344CB8AC3E}">
-        <p14:creationId xmlns:p14="http://schemas.microsoft.com/office/powerpoint/2010/main" val="2852977500"/>
+        <p14:creationId xmlns:p14="http://schemas.microsoft.com/office/powerpoint/2010/main" val="2719948004"/>
       </p:ext>
     </p:extLst>
   </p:cSld>
@@ -13434,14 +13325,14 @@
   <p:timing>
     <p:tnLst>
       <p:par>
-        <p:cTn id="1" dur="indefinite" restart="never" nodeType="tmRoot"/>
+        <p:cTn xmlns:p14="http://schemas.microsoft.com/office/powerpoint/2010/main" id="1" dur="indefinite" restart="never" nodeType="tmRoot"/>
       </p:par>
     </p:tnLst>
   </p:timing>
 </p:sld>
 </file>
 
-<file path=ppt/slides/slide15.xml><?xml version="1.0" encoding="utf-8"?>
+<file path=ppt/slides/slide14.xml><?xml version="1.0" encoding="utf-8"?>
 <p:sld xmlns:a="http://schemas.openxmlformats.org/drawingml/2006/main" xmlns:r="http://schemas.openxmlformats.org/officeDocument/2006/relationships" xmlns:p="http://schemas.openxmlformats.org/presentationml/2006/main">
   <p:cSld>
     <p:spTree>
@@ -13614,7 +13505,7 @@
     </p:spTree>
     <p:extLst>
       <p:ext uri="{BB962C8B-B14F-4D97-AF65-F5344CB8AC3E}">
-        <p14:creationId xmlns:p14="http://schemas.microsoft.com/office/powerpoint/2010/main" val="810882584"/>
+        <p14:creationId xmlns:p14="http://schemas.microsoft.com/office/powerpoint/2010/main" val="3175145749"/>
       </p:ext>
     </p:extLst>
   </p:cSld>
@@ -13624,14 +13515,14 @@
   <p:timing>
     <p:tnLst>
       <p:par>
-        <p:cTn id="1" dur="indefinite" restart="never" nodeType="tmRoot"/>
+        <p:cTn xmlns:p14="http://schemas.microsoft.com/office/powerpoint/2010/main" id="1" dur="indefinite" restart="never" nodeType="tmRoot"/>
       </p:par>
     </p:tnLst>
   </p:timing>
 </p:sld>
 </file>
 
-<file path=ppt/slides/slide16.xml><?xml version="1.0" encoding="utf-8"?>
+<file path=ppt/slides/slide15.xml><?xml version="1.0" encoding="utf-8"?>
 <p:sld xmlns:a="http://schemas.openxmlformats.org/drawingml/2006/main" xmlns:r="http://schemas.openxmlformats.org/officeDocument/2006/relationships" xmlns:p="http://schemas.openxmlformats.org/presentationml/2006/main">
   <p:cSld>
     <p:spTree>
@@ -13880,7 +13771,7 @@
   <p:timing>
     <p:tnLst>
       <p:par>
-        <p:cTn id="1" dur="indefinite" restart="never" nodeType="tmRoot"/>
+        <p:cTn xmlns:p14="http://schemas.microsoft.com/office/powerpoint/2010/main" id="1" dur="indefinite" restart="never" nodeType="tmRoot"/>
       </p:par>
     </p:tnLst>
   </p:timing>
@@ -13996,7 +13887,7 @@
   <p:timing>
     <p:tnLst>
       <p:par>
-        <p:cTn id="1" dur="indefinite" restart="never" nodeType="tmRoot"/>
+        <p:cTn xmlns:p14="http://schemas.microsoft.com/office/powerpoint/2010/main" id="1" dur="indefinite" restart="never" nodeType="tmRoot"/>
       </p:par>
     </p:tnLst>
   </p:timing>
@@ -14513,7 +14404,17 @@
                 <a:latin typeface="Menlo Regular"/>
                 <a:cs typeface="Arial"/>
               </a:rPr>
-              <a:t> a;</a:t>
+              <a:t> </a:t>
+            </a:r>
+            <a:r>
+              <a:rPr lang="en-US" altLang="zh-CN" sz="1400" dirty="0" smtClean="0">
+                <a:solidFill>
+                  <a:srgbClr val="000000"/>
+                </a:solidFill>
+                <a:latin typeface="Menlo Regular"/>
+                <a:cs typeface="Arial"/>
+              </a:rPr>
+              <a:t>a;</a:t>
             </a:r>
             <a:endParaRPr lang="en-US" altLang="zh-CN" sz="1400" dirty="0">
               <a:solidFill>
@@ -14899,7 +14800,7 @@
   <p:timing>
     <p:tnLst>
       <p:par>
-        <p:cTn id="1" dur="indefinite" restart="never" nodeType="tmRoot"/>
+        <p:cTn xmlns:p14="http://schemas.microsoft.com/office/powerpoint/2010/main" id="1" dur="indefinite" restart="never" nodeType="tmRoot"/>
       </p:par>
     </p:tnLst>
   </p:timing>
@@ -14986,11 +14887,11 @@
             </a:pPr>
             <a:r>
               <a:rPr lang="en-US" altLang="zh-CN" sz="1600" dirty="0" smtClean="0"/>
-              <a:t>    model </a:t>
+              <a:t>    dot</a:t>
             </a:r>
             <a:r>
               <a:rPr lang="en-US" altLang="zh-CN" sz="1600" dirty="0"/>
-              <a:t>dot(</a:t>
+              <a:t>(</a:t>
             </a:r>
             <a:r>
               <a:rPr lang="en-US" altLang="zh-CN" sz="1600" dirty="0" err="1"/>
@@ -15018,11 +14919,11 @@
             </a:pPr>
             <a:r>
               <a:rPr lang="en-US" altLang="zh-CN" sz="1600" dirty="0" smtClean="0"/>
-              <a:t>    model </a:t>
+              <a:t>    line</a:t>
             </a:r>
             <a:r>
               <a:rPr lang="en-US" altLang="zh-CN" sz="1600" dirty="0"/>
-              <a:t>line(dot1:dot,dot2:dot); </a:t>
+              <a:t>(dot1:dot,dot2:dot); </a:t>
             </a:r>
           </a:p>
           <a:p>
@@ -15034,11 +14935,19 @@
             </a:pPr>
             <a:r>
               <a:rPr lang="en-US" altLang="zh-CN" sz="1600" dirty="0" smtClean="0"/>
-              <a:t>    model </a:t>
+              <a:t>   </a:t>
             </a:r>
             <a:r>
               <a:rPr lang="en-US" altLang="zh-CN" sz="1600" dirty="0"/>
-              <a:t>polygons: polygons(</a:t>
+              <a:t> </a:t>
+            </a:r>
+            <a:r>
+              <a:rPr lang="en-US" altLang="zh-CN" sz="1600" dirty="0" smtClean="0"/>
+              <a:t>polygons</a:t>
+            </a:r>
+            <a:r>
+              <a:rPr lang="en-US" altLang="zh-CN" sz="1600" dirty="0"/>
+              <a:t>: polygons(</a:t>
             </a:r>
             <a:r>
               <a:rPr lang="en-US" altLang="zh-CN" sz="1600" dirty="0" err="1"/>
@@ -15059,11 +14968,19 @@
             </a:pPr>
             <a:r>
               <a:rPr lang="en-US" altLang="zh-CN" sz="1600" dirty="0" smtClean="0"/>
-              <a:t>    model </a:t>
+              <a:t>   </a:t>
             </a:r>
             <a:r>
               <a:rPr lang="en-US" altLang="zh-CN" sz="1600" dirty="0"/>
-              <a:t>circle: circle(</a:t>
+              <a:t> </a:t>
+            </a:r>
+            <a:r>
+              <a:rPr lang="en-US" altLang="zh-CN" sz="1600" dirty="0" smtClean="0"/>
+              <a:t>circle</a:t>
+            </a:r>
+            <a:r>
+              <a:rPr lang="en-US" altLang="zh-CN" sz="1600" dirty="0"/>
+              <a:t>: circle(</a:t>
             </a:r>
             <a:r>
               <a:rPr lang="en-US" altLang="zh-CN" sz="1600" dirty="0" err="1"/>
@@ -15333,7 +15250,7 @@
     </p:spTree>
     <p:extLst>
       <p:ext uri="{BB962C8B-B14F-4D97-AF65-F5344CB8AC3E}">
-        <p14:creationId xmlns:p14="http://schemas.microsoft.com/office/powerpoint/2010/main" val="1097757520"/>
+        <p14:creationId xmlns:p14="http://schemas.microsoft.com/office/powerpoint/2010/main" val="3052971178"/>
       </p:ext>
     </p:extLst>
   </p:cSld>
@@ -15343,7 +15260,7 @@
   <p:timing>
     <p:tnLst>
       <p:par>
-        <p:cTn id="1" dur="indefinite" restart="never" nodeType="tmRoot"/>
+        <p:cTn xmlns:p14="http://schemas.microsoft.com/office/powerpoint/2010/main" id="1" dur="indefinite" restart="never" nodeType="tmRoot"/>
       </p:par>
     </p:tnLst>
   </p:timing>
@@ -15473,24 +15390,6 @@
                 <a:latin typeface="Menlo Regular"/>
                 <a:cs typeface="Menlo Regular"/>
               </a:rPr>
-              <a:t>@mode figure</a:t>
-            </a:r>
-          </a:p>
-          <a:p>
-            <a:pPr marL="0" indent="0">
-              <a:lnSpc>
-                <a:spcPct val="50000"/>
-              </a:lnSpc>
-              <a:spcBef>
-                <a:spcPts val="1400"/>
-              </a:spcBef>
-              <a:buNone/>
-            </a:pPr>
-            <a:r>
-              <a:rPr lang="en-US" altLang="zh-CN" sz="1400" dirty="0" smtClean="0">
-                <a:latin typeface="Menlo Regular"/>
-                <a:cs typeface="Menlo Regular"/>
-              </a:rPr>
               <a:t>//geometric shape declaration and initialization</a:t>
             </a:r>
           </a:p>
@@ -15831,7 +15730,7 @@
         </p:nvCxnSpPr>
         <p:spPr>
           <a:xfrm flipV="1">
-            <a:off x="1736724" y="2654528"/>
+            <a:off x="1746251" y="2392918"/>
             <a:ext cx="666750" cy="261610"/>
           </a:xfrm>
           <a:prstGeom prst="straightConnector1">
@@ -15864,7 +15763,7 @@
         </p:nvCxnSpPr>
         <p:spPr>
           <a:xfrm>
-            <a:off x="1736724" y="2916138"/>
+            <a:off x="1736724" y="2654528"/>
             <a:ext cx="666750" cy="0"/>
           </a:xfrm>
           <a:prstGeom prst="straightConnector1">
@@ -15897,7 +15796,7 @@
         </p:nvSpPr>
         <p:spPr>
           <a:xfrm>
-            <a:off x="149224" y="2546806"/>
+            <a:off x="149224" y="2285196"/>
             <a:ext cx="1714500" cy="738664"/>
           </a:xfrm>
           <a:prstGeom prst="rect">
@@ -15931,7 +15830,7 @@
         </p:nvSpPr>
         <p:spPr>
           <a:xfrm>
-            <a:off x="149224" y="3985081"/>
+            <a:off x="149224" y="3880306"/>
             <a:ext cx="1714500" cy="523220"/>
           </a:xfrm>
           <a:prstGeom prst="rect">
@@ -15969,7 +15868,7 @@
         </p:nvCxnSpPr>
         <p:spPr>
           <a:xfrm>
-            <a:off x="1736724" y="4357816"/>
+            <a:off x="1746251" y="4141916"/>
             <a:ext cx="666750" cy="0"/>
           </a:xfrm>
           <a:prstGeom prst="straightConnector1">
@@ -15996,82 +15895,13 @@
       </p:cxnSp>
       <p:sp>
         <p:nvSpPr>
-          <p:cNvPr id="22" name="文本框 21"/>
-          <p:cNvSpPr txBox="1"/>
-          <p:nvPr/>
-        </p:nvSpPr>
-        <p:spPr>
-          <a:xfrm>
-            <a:off x="149225" y="1600200"/>
-            <a:ext cx="1498599" cy="738664"/>
-          </a:xfrm>
-          <a:prstGeom prst="rect">
-            <a:avLst/>
-          </a:prstGeom>
-          <a:noFill/>
-        </p:spPr>
-        <p:txBody>
-          <a:bodyPr wrap="square" rtlCol="0">
-            <a:spAutoFit/>
-          </a:bodyPr>
-          <a:lstStyle/>
-          <a:p>
-            <a:r>
-              <a:rPr kumimoji="1" lang="en-US" altLang="zh-CN" sz="1400" dirty="0" smtClean="0"/>
-              <a:t>mode </a:t>
-            </a:r>
-            <a:r>
-              <a:rPr kumimoji="1" lang="en-US" altLang="zh-CN" sz="1400" dirty="0"/>
-              <a:t>that the program will be executed in </a:t>
-            </a:r>
-            <a:endParaRPr kumimoji="1" lang="zh-CN" altLang="en-US" sz="1400" dirty="0"/>
-          </a:p>
-        </p:txBody>
-      </p:sp>
-      <p:cxnSp>
-        <p:nvCxnSpPr>
-          <p:cNvPr id="23" name="直线箭头连接符 22"/>
-          <p:cNvCxnSpPr>
-            <a:stCxn id="22" idx="3"/>
-          </p:cNvCxnSpPr>
-          <p:nvPr/>
-        </p:nvCxnSpPr>
-        <p:spPr>
-          <a:xfrm>
-            <a:off x="1647824" y="1969532"/>
-            <a:ext cx="666750" cy="71110"/>
-          </a:xfrm>
-          <a:prstGeom prst="straightConnector1">
-            <a:avLst/>
-          </a:prstGeom>
-          <a:ln w="19050" cmpd="sng">
-            <a:tailEnd type="arrow"/>
-          </a:ln>
-        </p:spPr>
-        <p:style>
-          <a:lnRef idx="2">
-            <a:schemeClr val="accent1"/>
-          </a:lnRef>
-          <a:fillRef idx="0">
-            <a:schemeClr val="accent1"/>
-          </a:fillRef>
-          <a:effectRef idx="1">
-            <a:schemeClr val="accent1"/>
-          </a:effectRef>
-          <a:fontRef idx="minor">
-            <a:schemeClr val="tx1"/>
-          </a:fontRef>
-        </p:style>
-      </p:cxnSp>
-      <p:sp>
-        <p:nvSpPr>
           <p:cNvPr id="25" name="文本框 24"/>
           <p:cNvSpPr txBox="1"/>
           <p:nvPr/>
         </p:nvSpPr>
         <p:spPr>
           <a:xfrm>
-            <a:off x="149225" y="4724598"/>
+            <a:off x="149225" y="4462988"/>
             <a:ext cx="1914526" cy="523220"/>
           </a:xfrm>
           <a:prstGeom prst="rect">
@@ -16105,7 +15935,7 @@
         </p:nvCxnSpPr>
         <p:spPr>
           <a:xfrm>
-            <a:off x="1720850" y="4947910"/>
+            <a:off x="1720850" y="4699396"/>
             <a:ext cx="692151" cy="0"/>
           </a:xfrm>
           <a:prstGeom prst="straightConnector1">
@@ -16168,8 +15998,8 @@
         </p:nvCxnSpPr>
         <p:spPr>
           <a:xfrm flipH="1">
-            <a:off x="5588000" y="5540375"/>
-            <a:ext cx="825500" cy="236754"/>
+            <a:off x="5461000" y="5540375"/>
+            <a:ext cx="952500" cy="0"/>
           </a:xfrm>
           <a:prstGeom prst="straightConnector1">
             <a:avLst/>
@@ -16252,7 +16082,7 @@
   <p:timing>
     <p:tnLst>
       <p:par>
-        <p:cTn id="1" dur="indefinite" restart="never" nodeType="tmRoot"/>
+        <p:cTn xmlns:p14="http://schemas.microsoft.com/office/powerpoint/2010/main" id="1" dur="indefinite" restart="never" nodeType="tmRoot"/>
       </p:par>
     </p:tnLst>
   </p:timing>
@@ -16260,111 +16090,6 @@
 </file>
 
 <file path=ppt/slides/slide6.xml><?xml version="1.0" encoding="utf-8"?>
-<p:sld xmlns:a="http://schemas.openxmlformats.org/drawingml/2006/main" xmlns:r="http://schemas.openxmlformats.org/officeDocument/2006/relationships" xmlns:p="http://schemas.openxmlformats.org/presentationml/2006/main" show="0">
-  <p:cSld>
-    <p:spTree>
-      <p:nvGrpSpPr>
-        <p:cNvPr id="1" name=""/>
-        <p:cNvGrpSpPr/>
-        <p:nvPr/>
-      </p:nvGrpSpPr>
-      <p:grpSpPr>
-        <a:xfrm>
-          <a:off x="0" y="0"/>
-          <a:ext cx="0" cy="0"/>
-          <a:chOff x="0" y="0"/>
-          <a:chExt cx="0" cy="0"/>
-        </a:xfrm>
-      </p:grpSpPr>
-      <p:sp>
-        <p:nvSpPr>
-          <p:cNvPr id="2" name="标题 1"/>
-          <p:cNvSpPr>
-            <a:spLocks noGrp="1"/>
-          </p:cNvSpPr>
-          <p:nvPr>
-            <p:ph type="title"/>
-          </p:nvPr>
-        </p:nvSpPr>
-        <p:spPr/>
-        <p:txBody>
-          <a:bodyPr/>
-          <a:lstStyle/>
-          <a:p>
-            <a:r>
-              <a:rPr kumimoji="1" lang="en-US" altLang="zh-CN" dirty="0" smtClean="0"/>
-              <a:t>Language Tutorial</a:t>
-            </a:r>
-            <a:endParaRPr kumimoji="1" lang="zh-CN" altLang="en-US" dirty="0"/>
-          </a:p>
-        </p:txBody>
-      </p:sp>
-      <p:sp>
-        <p:nvSpPr>
-          <p:cNvPr id="3" name="内容占位符 2"/>
-          <p:cNvSpPr>
-            <a:spLocks noGrp="1"/>
-          </p:cNvSpPr>
-          <p:nvPr>
-            <p:ph idx="1"/>
-          </p:nvPr>
-        </p:nvSpPr>
-        <p:spPr/>
-        <p:txBody>
-          <a:bodyPr/>
-          <a:lstStyle/>
-          <a:p>
-            <a:r>
-              <a:rPr kumimoji="1" lang="en-US" altLang="zh-CN" dirty="0" smtClean="0"/>
-              <a:t>Add the graph example of last slide here</a:t>
-            </a:r>
-          </a:p>
-          <a:p>
-            <a:r>
-              <a:rPr kumimoji="1" lang="en-US" altLang="zh-CN" dirty="0" smtClean="0">
-                <a:solidFill>
-                  <a:srgbClr val="FF0000"/>
-                </a:solidFill>
-              </a:rPr>
-              <a:t>???</a:t>
-            </a:r>
-            <a:endParaRPr kumimoji="1" lang="zh-CN" altLang="en-US" dirty="0">
-              <a:solidFill>
-                <a:srgbClr val="FF0000"/>
-              </a:solidFill>
-            </a:endParaRPr>
-          </a:p>
-        </p:txBody>
-      </p:sp>
-    </p:spTree>
-    <p:extLst>
-      <p:ext uri="{BB962C8B-B14F-4D97-AF65-F5344CB8AC3E}">
-        <p14:creationId xmlns:p14="http://schemas.microsoft.com/office/powerpoint/2010/main" val="2744469473"/>
-      </p:ext>
-    </p:extLst>
-  </p:cSld>
-  <p:clrMapOvr>
-    <a:masterClrMapping/>
-  </p:clrMapOvr>
-  <mc:AlternateContent xmlns:mc="http://schemas.openxmlformats.org/markup-compatibility/2006">
-    <mc:Choice xmlns:p14="http://schemas.microsoft.com/office/powerpoint/2010/main" Requires="p14">
-      <p:transition spd="slow" p14:dur="2000"/>
-    </mc:Choice>
-    <mc:Fallback>
-      <p:transition spd="slow"/>
-    </mc:Fallback>
-  </mc:AlternateContent>
-  <p:timing>
-    <p:tnLst>
-      <p:par>
-        <p:cTn id="1" dur="indefinite" restart="never" nodeType="tmRoot"/>
-      </p:par>
-    </p:tnLst>
-  </p:timing>
-</p:sld>
-</file>
-
-<file path=ppt/slides/slide7.xml><?xml version="1.0" encoding="utf-8"?>
 <p:sld xmlns:a="http://schemas.openxmlformats.org/drawingml/2006/main" xmlns:r="http://schemas.openxmlformats.org/officeDocument/2006/relationships" xmlns:p="http://schemas.openxmlformats.org/presentationml/2006/main">
   <p:cSld>
     <p:spTree>
@@ -16445,14 +16170,14 @@
   <p:timing>
     <p:tnLst>
       <p:par>
-        <p:cTn id="1" dur="indefinite" restart="never" nodeType="tmRoot"/>
+        <p:cTn xmlns:p14="http://schemas.microsoft.com/office/powerpoint/2010/main" id="1" dur="indefinite" restart="never" nodeType="tmRoot"/>
       </p:par>
     </p:tnLst>
   </p:timing>
 </p:sld>
 </file>
 
-<file path=ppt/slides/slide8.xml><?xml version="1.0" encoding="utf-8"?>
+<file path=ppt/slides/slide7.xml><?xml version="1.0" encoding="utf-8"?>
 <p:sld xmlns:a="http://schemas.openxmlformats.org/drawingml/2006/main" xmlns:r="http://schemas.openxmlformats.org/officeDocument/2006/relationships" xmlns:p="http://schemas.openxmlformats.org/presentationml/2006/main">
   <p:cSld>
     <p:spTree>
@@ -17159,7 +16884,310 @@
   <p:timing>
     <p:tnLst>
       <p:par>
-        <p:cTn id="1" dur="indefinite" restart="never" nodeType="tmRoot"/>
+        <p:cTn xmlns:p14="http://schemas.microsoft.com/office/powerpoint/2010/main" id="1" dur="indefinite" restart="never" nodeType="tmRoot"/>
+      </p:par>
+    </p:tnLst>
+  </p:timing>
+</p:sld>
+</file>
+
+<file path=ppt/slides/slide8.xml><?xml version="1.0" encoding="utf-8"?>
+<p:sld xmlns:a="http://schemas.openxmlformats.org/drawingml/2006/main" xmlns:r="http://schemas.openxmlformats.org/officeDocument/2006/relationships" xmlns:p="http://schemas.openxmlformats.org/presentationml/2006/main">
+  <p:cSld>
+    <p:spTree>
+      <p:nvGrpSpPr>
+        <p:cNvPr id="1" name=""/>
+        <p:cNvGrpSpPr/>
+        <p:nvPr/>
+      </p:nvGrpSpPr>
+      <p:grpSpPr>
+        <a:xfrm>
+          <a:off x="0" y="0"/>
+          <a:ext cx="0" cy="0"/>
+          <a:chOff x="0" y="0"/>
+          <a:chExt cx="0" cy="0"/>
+        </a:xfrm>
+      </p:grpSpPr>
+      <p:sp>
+        <p:nvSpPr>
+          <p:cNvPr id="2" name="标题 1"/>
+          <p:cNvSpPr>
+            <a:spLocks noGrp="1"/>
+          </p:cNvSpPr>
+          <p:nvPr>
+            <p:ph type="title"/>
+          </p:nvPr>
+        </p:nvSpPr>
+        <p:spPr/>
+        <p:txBody>
+          <a:bodyPr/>
+          <a:lstStyle/>
+          <a:p>
+            <a:r>
+              <a:rPr kumimoji="1" lang="en-US" altLang="zh-CN" dirty="0" smtClean="0"/>
+              <a:t>Semantic Check </a:t>
+            </a:r>
+            <a:endParaRPr kumimoji="1" lang="zh-CN" altLang="en-US" dirty="0"/>
+          </a:p>
+        </p:txBody>
+      </p:sp>
+      <p:sp>
+        <p:nvSpPr>
+          <p:cNvPr id="4" name="内容占位符 3"/>
+          <p:cNvSpPr txBox="1">
+            <a:spLocks noGrp="1"/>
+          </p:cNvSpPr>
+          <p:nvPr>
+            <p:ph idx="1"/>
+          </p:nvPr>
+        </p:nvSpPr>
+        <p:spPr>
+          <a:xfrm>
+            <a:off x="498474" y="1460956"/>
+            <a:ext cx="7556313" cy="4308872"/>
+          </a:xfrm>
+          <a:prstGeom prst="rect">
+            <a:avLst/>
+          </a:prstGeom>
+          <a:noFill/>
+        </p:spPr>
+        <p:txBody>
+          <a:bodyPr wrap="square" rtlCol="0">
+            <a:spAutoFit/>
+          </a:bodyPr>
+          <a:lstStyle/>
+          <a:p>
+            <a:pPr>
+              <a:spcBef>
+                <a:spcPts val="0"/>
+              </a:spcBef>
+            </a:pPr>
+            <a:r>
+              <a:rPr lang="en-US" altLang="zh-CN" sz="2400" dirty="0" smtClean="0">
+                <a:solidFill>
+                  <a:schemeClr val="accent1"/>
+                </a:solidFill>
+              </a:rPr>
+              <a:t>Semantic Check </a:t>
+            </a:r>
+            <a:endParaRPr lang="en-US" altLang="zh-CN" sz="2400" dirty="0">
+              <a:solidFill>
+                <a:schemeClr val="accent1"/>
+              </a:solidFill>
+            </a:endParaRPr>
+          </a:p>
+          <a:p>
+            <a:pPr marL="228600" lvl="2">
+              <a:spcBef>
+                <a:spcPts val="0"/>
+              </a:spcBef>
+              <a:buFont typeface="Wingdings" charset="2"/>
+              <a:buChar char="Ø"/>
+            </a:pPr>
+            <a:r>
+              <a:rPr lang="en-US" altLang="zh-CN" sz="2000" dirty="0" smtClean="0"/>
+              <a:t>Use </a:t>
+            </a:r>
+            <a:r>
+              <a:rPr lang="en-US" altLang="zh-CN" sz="2000" dirty="0" err="1" smtClean="0"/>
+              <a:t>StringMap</a:t>
+            </a:r>
+            <a:r>
+              <a:rPr lang="en-US" altLang="zh-CN" sz="2000" dirty="0" smtClean="0"/>
+              <a:t> to implement translation environments </a:t>
+            </a:r>
+          </a:p>
+          <a:p>
+            <a:pPr marL="228600" lvl="1" indent="0">
+              <a:spcBef>
+                <a:spcPts val="0"/>
+              </a:spcBef>
+              <a:buNone/>
+            </a:pPr>
+            <a:r>
+              <a:rPr lang="en-US" altLang="zh-CN" dirty="0" err="1" smtClean="0"/>
+              <a:t>vars</a:t>
+            </a:r>
+            <a:r>
+              <a:rPr lang="en-US" altLang="zh-CN" dirty="0" smtClean="0"/>
+              <a:t>: keep information about variables </a:t>
+            </a:r>
+          </a:p>
+          <a:p>
+            <a:pPr marL="228600" lvl="1" indent="0">
+              <a:spcBef>
+                <a:spcPts val="0"/>
+              </a:spcBef>
+              <a:buNone/>
+            </a:pPr>
+            <a:r>
+              <a:rPr lang="en-US" altLang="zh-CN" dirty="0" err="1" smtClean="0"/>
+              <a:t>funcs</a:t>
+            </a:r>
+            <a:r>
+              <a:rPr lang="en-US" altLang="zh-CN" dirty="0" smtClean="0"/>
+              <a:t>: keep information </a:t>
+            </a:r>
+            <a:r>
+              <a:rPr lang="en-US" altLang="zh-CN" dirty="0"/>
+              <a:t>about functions </a:t>
+            </a:r>
+            <a:endParaRPr lang="en-US" altLang="zh-CN" dirty="0" smtClean="0"/>
+          </a:p>
+          <a:p>
+            <a:pPr marL="228600" lvl="1" indent="0">
+              <a:spcBef>
+                <a:spcPts val="0"/>
+              </a:spcBef>
+              <a:buNone/>
+            </a:pPr>
+            <a:r>
+              <a:rPr lang="en-US" altLang="zh-CN" dirty="0" err="1"/>
+              <a:t>func_opt</a:t>
+            </a:r>
+            <a:r>
+              <a:rPr lang="en-US" altLang="zh-CN" dirty="0"/>
+              <a:t>: keep information about types of function parameters</a:t>
+            </a:r>
+          </a:p>
+          <a:p>
+            <a:pPr marL="228600" lvl="1" indent="0">
+              <a:spcBef>
+                <a:spcPts val="0"/>
+              </a:spcBef>
+              <a:buNone/>
+            </a:pPr>
+            <a:endParaRPr lang="en-US" altLang="zh-CN" sz="1000" dirty="0"/>
+          </a:p>
+          <a:p>
+            <a:pPr>
+              <a:spcBef>
+                <a:spcPts val="0"/>
+              </a:spcBef>
+              <a:buFont typeface="Wingdings" charset="2"/>
+              <a:buChar char="Ø"/>
+            </a:pPr>
+            <a:r>
+              <a:rPr lang="en-US" altLang="zh-CN" dirty="0" smtClean="0"/>
+              <a:t>Check for:</a:t>
+            </a:r>
+          </a:p>
+          <a:p>
+            <a:pPr marL="228600" lvl="1" indent="0">
+              <a:spcBef>
+                <a:spcPts val="0"/>
+              </a:spcBef>
+              <a:buNone/>
+            </a:pPr>
+            <a:r>
+              <a:rPr lang="en-US" altLang="zh-CN" dirty="0" smtClean="0"/>
+              <a:t>undeclared variables and functions</a:t>
+            </a:r>
+          </a:p>
+          <a:p>
+            <a:pPr marL="228600" lvl="1" indent="0">
+              <a:spcBef>
+                <a:spcPts val="0"/>
+              </a:spcBef>
+              <a:buNone/>
+            </a:pPr>
+            <a:r>
+              <a:rPr lang="en-US" altLang="zh-CN" dirty="0" smtClean="0"/>
+              <a:t>mismatched types</a:t>
+            </a:r>
+          </a:p>
+          <a:p>
+            <a:pPr marL="228600" lvl="1" indent="0">
+              <a:spcBef>
+                <a:spcPts val="0"/>
+              </a:spcBef>
+              <a:buNone/>
+            </a:pPr>
+            <a:r>
+              <a:rPr kumimoji="1" lang="en-US" altLang="zh-CN" dirty="0" smtClean="0"/>
+              <a:t>wrong types</a:t>
+            </a:r>
+          </a:p>
+          <a:p>
+            <a:pPr marL="228600" lvl="1" indent="0">
+              <a:spcBef>
+                <a:spcPts val="0"/>
+              </a:spcBef>
+              <a:buNone/>
+            </a:pPr>
+            <a:r>
+              <a:rPr kumimoji="1" lang="en-US" altLang="zh-CN" dirty="0"/>
+              <a:t>f</a:t>
+            </a:r>
+            <a:r>
+              <a:rPr kumimoji="1" lang="en-US" altLang="zh-CN" dirty="0" smtClean="0"/>
+              <a:t>unction parameters not match</a:t>
+            </a:r>
+          </a:p>
+          <a:p>
+            <a:pPr marL="228600" lvl="1" indent="0">
+              <a:spcBef>
+                <a:spcPts val="0"/>
+              </a:spcBef>
+              <a:buNone/>
+            </a:pPr>
+            <a:r>
+              <a:rPr kumimoji="1" lang="en-US" altLang="zh-CN" dirty="0"/>
+              <a:t>u</a:t>
+            </a:r>
+            <a:r>
+              <a:rPr kumimoji="1" lang="en-US" altLang="zh-CN" dirty="0" smtClean="0"/>
+              <a:t>ndefined operations</a:t>
+            </a:r>
+          </a:p>
+          <a:p>
+            <a:pPr marL="228600" lvl="1" indent="0">
+              <a:spcBef>
+                <a:spcPts val="0"/>
+              </a:spcBef>
+              <a:buNone/>
+            </a:pPr>
+            <a:r>
+              <a:rPr kumimoji="1" lang="en-US" altLang="zh-CN" dirty="0" smtClean="0"/>
+              <a:t>Geo syntax error</a:t>
+            </a:r>
+          </a:p>
+          <a:p>
+            <a:pPr marL="228600" lvl="1" indent="0">
+              <a:spcBef>
+                <a:spcPts val="0"/>
+              </a:spcBef>
+              <a:buNone/>
+            </a:pPr>
+            <a:r>
+              <a:rPr kumimoji="1" lang="en-US" altLang="zh-CN" dirty="0" smtClean="0"/>
+              <a:t>…..</a:t>
+            </a:r>
+          </a:p>
+          <a:p>
+            <a:pPr>
+              <a:spcBef>
+                <a:spcPts val="0"/>
+              </a:spcBef>
+            </a:pPr>
+            <a:endParaRPr kumimoji="1" lang="zh-CN" altLang="en-US" dirty="0"/>
+          </a:p>
+        </p:txBody>
+      </p:sp>
+    </p:spTree>
+    <p:extLst>
+      <p:ext uri="{BB962C8B-B14F-4D97-AF65-F5344CB8AC3E}">
+        <p14:creationId xmlns:p14="http://schemas.microsoft.com/office/powerpoint/2010/main" val="3193706919"/>
+      </p:ext>
+    </p:extLst>
+  </p:cSld>
+  <p:clrMapOvr>
+    <a:masterClrMapping/>
+  </p:clrMapOvr>
+  <p:timing>
+    <p:tnLst>
+      <p:par>
+        <p:cTn xmlns:p14="http://schemas.microsoft.com/office/powerpoint/2010/main" id="1" dur="indefinite" restart="never" nodeType="tmRoot"/>
       </p:par>
     </p:tnLst>
   </p:timing>
@@ -17199,17 +17227,25 @@
           <a:lstStyle/>
           <a:p>
             <a:r>
+              <a:rPr kumimoji="1" lang="en-US" altLang="zh-CN" dirty="0"/>
+              <a:t>Code </a:t>
+            </a:r>
+            <a:r>
               <a:rPr kumimoji="1" lang="en-US" altLang="zh-CN" dirty="0" smtClean="0"/>
-              <a:t>Semantic Check </a:t>
-            </a:r>
-            <a:endParaRPr kumimoji="1" lang="zh-CN" altLang="en-US" dirty="0"/>
-          </a:p>
-        </p:txBody>
-      </p:sp>
-      <p:sp>
-        <p:nvSpPr>
-          <p:cNvPr id="4" name="内容占位符 3"/>
-          <p:cNvSpPr txBox="1">
+              <a:t>Generation</a:t>
+            </a:r>
+            <a:endParaRPr kumimoji="1" lang="zh-CN" altLang="en-US" dirty="0">
+              <a:solidFill>
+                <a:srgbClr val="FF0000"/>
+              </a:solidFill>
+            </a:endParaRPr>
+          </a:p>
+        </p:txBody>
+      </p:sp>
+      <p:sp>
+        <p:nvSpPr>
+          <p:cNvPr id="3" name="内容占位符 2"/>
+          <p:cNvSpPr>
             <a:spLocks noGrp="1"/>
           </p:cNvSpPr>
           <p:nvPr>
@@ -17218,8 +17254,58 @@
         </p:nvSpPr>
         <p:spPr>
           <a:xfrm>
-            <a:off x="498474" y="1460956"/>
-            <a:ext cx="7556313" cy="4308872"/>
+            <a:off x="498474" y="1600200"/>
+            <a:ext cx="7556313" cy="4144963"/>
+          </a:xfrm>
+        </p:spPr>
+        <p:txBody>
+          <a:bodyPr/>
+          <a:lstStyle/>
+          <a:p>
+            <a:r>
+              <a:rPr kumimoji="1" lang="en-US" altLang="zh-CN" sz="2400" dirty="0" smtClean="0">
+                <a:solidFill>
+                  <a:schemeClr val="accent1"/>
+                </a:solidFill>
+              </a:rPr>
+              <a:t>Algorithm Example (</a:t>
+            </a:r>
+            <a:r>
+              <a:rPr kumimoji="1" lang="en-US" altLang="zh-CN" sz="2400" dirty="0" err="1" smtClean="0">
+                <a:solidFill>
+                  <a:schemeClr val="accent1"/>
+                </a:solidFill>
+              </a:rPr>
+              <a:t>demo_fb.g</a:t>
+            </a:r>
+            <a:r>
+              <a:rPr kumimoji="1" lang="en-US" altLang="zh-CN" sz="2400" dirty="0" smtClean="0">
+                <a:solidFill>
+                  <a:schemeClr val="accent1"/>
+                </a:solidFill>
+              </a:rPr>
+              <a:t>)</a:t>
+            </a:r>
+          </a:p>
+          <a:p>
+            <a:endParaRPr kumimoji="1" lang="en-US" altLang="zh-CN" sz="2400" dirty="0" smtClean="0">
+              <a:solidFill>
+                <a:schemeClr val="accent1"/>
+              </a:solidFill>
+            </a:endParaRPr>
+          </a:p>
+        </p:txBody>
+      </p:sp>
+      <p:sp>
+        <p:nvSpPr>
+          <p:cNvPr id="4" name="TextBox 3"/>
+          <p:cNvSpPr txBox="1"/>
+          <p:nvPr/>
+        </p:nvSpPr>
+        <p:spPr>
+          <a:xfrm>
+            <a:off x="2871788" y="2657475"/>
+            <a:ext cx="184731" cy="369332"/>
           </a:xfrm>
           <a:prstGeom prst="rect">
             <a:avLst/>
@@ -17227,232 +17313,79 @@
           <a:noFill/>
         </p:spPr>
         <p:txBody>
-          <a:bodyPr wrap="square" rtlCol="0">
+          <a:bodyPr wrap="none" rtlCol="0">
             <a:spAutoFit/>
           </a:bodyPr>
           <a:lstStyle/>
           <a:p>
-            <a:pPr>
-              <a:spcBef>
-                <a:spcPts val="0"/>
-              </a:spcBef>
-            </a:pPr>
-            <a:r>
-              <a:rPr lang="en-US" altLang="zh-CN" sz="2400" dirty="0" smtClean="0">
-                <a:solidFill>
-                  <a:schemeClr val="accent1"/>
-                </a:solidFill>
-              </a:rPr>
-              <a:t>Semantic Check </a:t>
-            </a:r>
-            <a:endParaRPr lang="en-US" altLang="zh-CN" sz="2400" dirty="0">
-              <a:solidFill>
-                <a:schemeClr val="accent1"/>
-              </a:solidFill>
-            </a:endParaRPr>
-          </a:p>
-          <a:p>
-            <a:pPr marL="228600" lvl="2">
-              <a:spcBef>
-                <a:spcPts val="0"/>
-              </a:spcBef>
-              <a:buFont typeface="Wingdings" charset="2"/>
-              <a:buChar char="Ø"/>
-            </a:pPr>
-            <a:r>
-              <a:rPr lang="en-US" altLang="zh-CN" sz="2000" dirty="0" smtClean="0"/>
-              <a:t>Use </a:t>
-            </a:r>
-            <a:r>
-              <a:rPr lang="en-US" altLang="zh-CN" sz="2000" dirty="0" err="1" smtClean="0"/>
-              <a:t>StringMap</a:t>
-            </a:r>
-            <a:r>
-              <a:rPr lang="en-US" altLang="zh-CN" sz="2000" dirty="0" smtClean="0"/>
-              <a:t> to implement translation environments </a:t>
-            </a:r>
-          </a:p>
-          <a:p>
-            <a:pPr marL="228600" lvl="1" indent="0">
-              <a:spcBef>
-                <a:spcPts val="0"/>
-              </a:spcBef>
-              <a:buNone/>
-            </a:pPr>
-            <a:r>
-              <a:rPr lang="en-US" altLang="zh-CN" dirty="0" err="1" smtClean="0"/>
-              <a:t>vars</a:t>
-            </a:r>
-            <a:r>
-              <a:rPr lang="en-US" altLang="zh-CN" dirty="0" smtClean="0"/>
-              <a:t>: keep information about variables </a:t>
-            </a:r>
-          </a:p>
-          <a:p>
-            <a:pPr marL="228600" lvl="1" indent="0">
-              <a:spcBef>
-                <a:spcPts val="0"/>
-              </a:spcBef>
-              <a:buNone/>
-            </a:pPr>
-            <a:r>
-              <a:rPr lang="en-US" altLang="zh-CN" dirty="0" err="1" smtClean="0"/>
-              <a:t>funcs</a:t>
-            </a:r>
-            <a:r>
-              <a:rPr lang="en-US" altLang="zh-CN" dirty="0" smtClean="0"/>
-              <a:t>: keep information </a:t>
-            </a:r>
-            <a:r>
-              <a:rPr lang="en-US" altLang="zh-CN" dirty="0"/>
-              <a:t>about functions </a:t>
-            </a:r>
-            <a:endParaRPr lang="en-US" altLang="zh-CN" dirty="0" smtClean="0"/>
-          </a:p>
-          <a:p>
-            <a:pPr marL="228600" lvl="1" indent="0">
-              <a:spcBef>
-                <a:spcPts val="0"/>
-              </a:spcBef>
-              <a:buNone/>
-            </a:pPr>
-            <a:r>
-              <a:rPr lang="en-US" altLang="zh-CN" dirty="0" err="1"/>
-              <a:t>func_opt</a:t>
-            </a:r>
-            <a:r>
-              <a:rPr lang="en-US" altLang="zh-CN" dirty="0"/>
-              <a:t>: keep information about types of function parameters</a:t>
-            </a:r>
-          </a:p>
-          <a:p>
-            <a:pPr marL="228600" lvl="1" indent="0">
-              <a:spcBef>
-                <a:spcPts val="0"/>
-              </a:spcBef>
-              <a:buNone/>
-            </a:pPr>
-            <a:endParaRPr lang="en-US" altLang="zh-CN" sz="1000" dirty="0"/>
-          </a:p>
-          <a:p>
-            <a:pPr>
-              <a:spcBef>
-                <a:spcPts val="0"/>
-              </a:spcBef>
-              <a:buFont typeface="Wingdings" charset="2"/>
-              <a:buChar char="Ø"/>
-            </a:pPr>
-            <a:r>
-              <a:rPr lang="en-US" altLang="zh-CN" dirty="0" smtClean="0"/>
-              <a:t>Check for:</a:t>
-            </a:r>
-          </a:p>
-          <a:p>
-            <a:pPr marL="228600" lvl="1" indent="0">
-              <a:spcBef>
-                <a:spcPts val="0"/>
-              </a:spcBef>
-              <a:buNone/>
-            </a:pPr>
-            <a:r>
-              <a:rPr lang="en-US" altLang="zh-CN" dirty="0" smtClean="0"/>
-              <a:t>undeclared variables and functions</a:t>
-            </a:r>
-          </a:p>
-          <a:p>
-            <a:pPr marL="228600" lvl="1" indent="0">
-              <a:spcBef>
-                <a:spcPts val="0"/>
-              </a:spcBef>
-              <a:buNone/>
-            </a:pPr>
-            <a:r>
-              <a:rPr lang="en-US" altLang="zh-CN" dirty="0" smtClean="0"/>
-              <a:t>mismatched types</a:t>
-            </a:r>
-          </a:p>
-          <a:p>
-            <a:pPr marL="228600" lvl="1" indent="0">
-              <a:spcBef>
-                <a:spcPts val="0"/>
-              </a:spcBef>
-              <a:buNone/>
-            </a:pPr>
-            <a:r>
-              <a:rPr kumimoji="1" lang="en-US" altLang="zh-CN" dirty="0" smtClean="0"/>
-              <a:t>wrong types</a:t>
-            </a:r>
-          </a:p>
-          <a:p>
-            <a:pPr marL="228600" lvl="1" indent="0">
-              <a:spcBef>
-                <a:spcPts val="0"/>
-              </a:spcBef>
-              <a:buNone/>
-            </a:pPr>
-            <a:r>
-              <a:rPr kumimoji="1" lang="en-US" altLang="zh-CN" dirty="0"/>
-              <a:t>f</a:t>
-            </a:r>
-            <a:r>
-              <a:rPr kumimoji="1" lang="en-US" altLang="zh-CN" dirty="0" smtClean="0"/>
-              <a:t>unction parameters not match</a:t>
-            </a:r>
-          </a:p>
-          <a:p>
-            <a:pPr marL="228600" lvl="1" indent="0">
-              <a:spcBef>
-                <a:spcPts val="0"/>
-              </a:spcBef>
-              <a:buNone/>
-            </a:pPr>
-            <a:r>
-              <a:rPr kumimoji="1" lang="en-US" altLang="zh-CN" dirty="0"/>
-              <a:t>u</a:t>
-            </a:r>
-            <a:r>
-              <a:rPr kumimoji="1" lang="en-US" altLang="zh-CN" dirty="0" smtClean="0"/>
-              <a:t>ndefined operations</a:t>
-            </a:r>
-          </a:p>
-          <a:p>
-            <a:pPr marL="228600" lvl="1" indent="0">
-              <a:spcBef>
-                <a:spcPts val="0"/>
-              </a:spcBef>
-              <a:buNone/>
-            </a:pPr>
-            <a:r>
-              <a:rPr kumimoji="1" lang="en-US" altLang="zh-CN" dirty="0" smtClean="0"/>
-              <a:t>Geo syntax error</a:t>
-            </a:r>
-          </a:p>
-          <a:p>
-            <a:pPr marL="228600" lvl="1" indent="0">
-              <a:spcBef>
-                <a:spcPts val="0"/>
-              </a:spcBef>
-              <a:buNone/>
-            </a:pPr>
-            <a:r>
-              <a:rPr kumimoji="1" lang="en-US" altLang="zh-CN" dirty="0" smtClean="0"/>
-              <a:t>…..</a:t>
-            </a:r>
-          </a:p>
-          <a:p>
-            <a:pPr>
-              <a:spcBef>
-                <a:spcPts val="0"/>
-              </a:spcBef>
-            </a:pPr>
-            <a:endParaRPr kumimoji="1" lang="zh-CN" altLang="en-US" dirty="0"/>
-          </a:p>
-        </p:txBody>
-      </p:sp>
+            <a:endParaRPr lang="en-US" dirty="0"/>
+          </a:p>
+        </p:txBody>
+      </p:sp>
+      <p:pic>
+        <p:nvPicPr>
+          <p:cNvPr id="6" name="Picture 5"/>
+          <p:cNvPicPr>
+            <a:picLocks noChangeAspect="1"/>
+          </p:cNvPicPr>
+          <p:nvPr/>
+        </p:nvPicPr>
+        <p:blipFill>
+          <a:blip r:embed="rId2">
+            <a:extLst>
+              <a:ext uri="{28A0092B-C50C-407E-A947-70E740481C1C}">
+                <a14:useLocalDpi xmlns:a14="http://schemas.microsoft.com/office/drawing/2010/main" val="0"/>
+              </a:ext>
+            </a:extLst>
+          </a:blip>
+          <a:stretch>
+            <a:fillRect/>
+          </a:stretch>
+        </p:blipFill>
+        <p:spPr>
+          <a:xfrm>
+            <a:off x="625368" y="2206625"/>
+            <a:ext cx="3937000" cy="3759200"/>
+          </a:xfrm>
+          <a:prstGeom prst="rect">
+            <a:avLst/>
+          </a:prstGeom>
+        </p:spPr>
+      </p:pic>
+      <p:pic>
+        <p:nvPicPr>
+          <p:cNvPr id="7" name="Picture 6"/>
+          <p:cNvPicPr>
+            <a:picLocks noChangeAspect="1"/>
+          </p:cNvPicPr>
+          <p:nvPr/>
+        </p:nvPicPr>
+        <p:blipFill>
+          <a:blip r:embed="rId3">
+            <a:extLst>
+              <a:ext uri="{28A0092B-C50C-407E-A947-70E740481C1C}">
+                <a14:useLocalDpi xmlns:a14="http://schemas.microsoft.com/office/drawing/2010/main" val="0"/>
+              </a:ext>
+            </a:extLst>
+          </a:blip>
+          <a:stretch>
+            <a:fillRect/>
+          </a:stretch>
+        </p:blipFill>
+        <p:spPr>
+          <a:xfrm>
+            <a:off x="4689262" y="2206625"/>
+            <a:ext cx="4013200" cy="3225800"/>
+          </a:xfrm>
+          <a:prstGeom prst="rect">
+            <a:avLst/>
+          </a:prstGeom>
+        </p:spPr>
+      </p:pic>
     </p:spTree>
     <p:extLst>
       <p:ext uri="{BB962C8B-B14F-4D97-AF65-F5344CB8AC3E}">
-        <p14:creationId xmlns:p14="http://schemas.microsoft.com/office/powerpoint/2010/main" val="3193706919"/>
+        <p14:creationId xmlns:p14="http://schemas.microsoft.com/office/powerpoint/2010/main" val="46623091"/>
       </p:ext>
     </p:extLst>
   </p:cSld>
@@ -17462,7 +17395,7 @@
   <p:timing>
     <p:tnLst>
       <p:par>
-        <p:cTn id="1" dur="indefinite" restart="never" nodeType="tmRoot"/>
+        <p:cTn xmlns:p14="http://schemas.microsoft.com/office/powerpoint/2010/main" id="1" dur="indefinite" restart="never" nodeType="tmRoot"/>
       </p:par>
     </p:tnLst>
   </p:timing>
@@ -17736,9 +17669,9 @@
 </file>
 
 <file path=ppt/theme/theme2.xml><?xml version="1.0" encoding="utf-8"?>
-<a:theme xmlns:a="http://schemas.openxmlformats.org/drawingml/2006/main" name="Office Theme">
+<a:theme xmlns:a="http://schemas.openxmlformats.org/drawingml/2006/main" name="Office 主题">
   <a:themeElements>
-    <a:clrScheme name="Office">
+    <a:clrScheme name="办公室">
       <a:dk1>
         <a:sysClr val="windowText" lastClr="000000"/>
       </a:dk1>
@@ -17746,39 +17679,39 @@
         <a:sysClr val="window" lastClr="FFFFFF"/>
       </a:lt1>
       <a:dk2>
-        <a:srgbClr val="44546A"/>
+        <a:srgbClr val="1F497D"/>
       </a:dk2>
       <a:lt2>
-        <a:srgbClr val="E7E6E6"/>
+        <a:srgbClr val="EEECE1"/>
       </a:lt2>
       <a:accent1>
-        <a:srgbClr val="5B9BD5"/>
+        <a:srgbClr val="4F81BD"/>
       </a:accent1>
       <a:accent2>
-        <a:srgbClr val="ED7D31"/>
+        <a:srgbClr val="C0504D"/>
       </a:accent2>
       <a:accent3>
-        <a:srgbClr val="A5A5A5"/>
+        <a:srgbClr val="9BBB59"/>
       </a:accent3>
       <a:accent4>
-        <a:srgbClr val="FFC000"/>
+        <a:srgbClr val="8064A2"/>
       </a:accent4>
       <a:accent5>
-        <a:srgbClr val="4472C4"/>
+        <a:srgbClr val="4BACC6"/>
       </a:accent5>
       <a:accent6>
-        <a:srgbClr val="70AD47"/>
+        <a:srgbClr val="F79646"/>
       </a:accent6>
       <a:hlink>
-        <a:srgbClr val="0563C1"/>
+        <a:srgbClr val="0000FF"/>
       </a:hlink>
       <a:folHlink>
-        <a:srgbClr val="954F72"/>
+        <a:srgbClr val="800080"/>
       </a:folHlink>
     </a:clrScheme>
-    <a:fontScheme name="Office">
+    <a:fontScheme name="办公室">
       <a:majorFont>
-        <a:latin typeface="Calibri Light" panose="020F0302020204030204"/>
+        <a:latin typeface="Calibri"/>
         <a:ea typeface=""/>
         <a:cs typeface=""/>
         <a:font script="Jpan" typeface="ＭＳ Ｐゴシック"/>
@@ -17813,7 +17746,7 @@
         <a:font script="Geor" typeface="Sylfaen"/>
       </a:majorFont>
       <a:minorFont>
-        <a:latin typeface="Calibri" panose="020F0502020204030204"/>
+        <a:latin typeface="Calibri"/>
         <a:ea typeface=""/>
         <a:cs typeface=""/>
         <a:font script="Jpan" typeface="ＭＳ Ｐゴシック"/>
@@ -17848,7 +17781,7 @@
         <a:font script="Geor" typeface="Sylfaen"/>
       </a:minorFont>
     </a:fontScheme>
-    <a:fmtScheme name="Office">
+    <a:fmtScheme name="办公室">
       <a:fillStyleLst>
         <a:solidFill>
           <a:schemeClr val="phClr"/>
@@ -17857,141 +17790,200 @@
           <a:gsLst>
             <a:gs pos="0">
               <a:schemeClr val="phClr">
-                <a:lumMod val="110000"/>
-                <a:satMod val="105000"/>
-                <a:tint val="67000"/>
+                <a:tint val="50000"/>
+                <a:satMod val="300000"/>
               </a:schemeClr>
             </a:gs>
-            <a:gs pos="50000">
+            <a:gs pos="35000">
               <a:schemeClr val="phClr">
-                <a:lumMod val="105000"/>
-                <a:satMod val="103000"/>
-                <a:tint val="73000"/>
+                <a:tint val="37000"/>
+                <a:satMod val="300000"/>
               </a:schemeClr>
             </a:gs>
             <a:gs pos="100000">
               <a:schemeClr val="phClr">
-                <a:lumMod val="105000"/>
-                <a:satMod val="109000"/>
-                <a:tint val="81000"/>
+                <a:tint val="15000"/>
+                <a:satMod val="350000"/>
               </a:schemeClr>
             </a:gs>
           </a:gsLst>
-          <a:lin ang="5400000" scaled="0"/>
+          <a:lin ang="16200000" scaled="1"/>
         </a:gradFill>
         <a:gradFill rotWithShape="1">
           <a:gsLst>
             <a:gs pos="0">
               <a:schemeClr val="phClr">
-                <a:satMod val="103000"/>
-                <a:lumMod val="102000"/>
-                <a:tint val="94000"/>
-              </a:schemeClr>
-            </a:gs>
-            <a:gs pos="50000">
-              <a:schemeClr val="phClr">
-                <a:satMod val="110000"/>
-                <a:lumMod val="100000"/>
+                <a:tint val="100000"/>
                 <a:shade val="100000"/>
+                <a:satMod val="130000"/>
               </a:schemeClr>
             </a:gs>
             <a:gs pos="100000">
               <a:schemeClr val="phClr">
-                <a:lumMod val="99000"/>
-                <a:satMod val="120000"/>
-                <a:shade val="78000"/>
+                <a:tint val="50000"/>
+                <a:shade val="100000"/>
+                <a:satMod val="350000"/>
               </a:schemeClr>
             </a:gs>
           </a:gsLst>
-          <a:lin ang="5400000" scaled="0"/>
+          <a:lin ang="16200000" scaled="0"/>
         </a:gradFill>
       </a:fillStyleLst>
       <a:lnStyleLst>
-        <a:ln w="6350" cap="flat" cmpd="sng" algn="ctr">
+        <a:ln w="9525" cap="flat" cmpd="sng" algn="ctr">
+          <a:solidFill>
+            <a:schemeClr val="phClr">
+              <a:shade val="95000"/>
+              <a:satMod val="105000"/>
+            </a:schemeClr>
+          </a:solidFill>
+          <a:prstDash val="solid"/>
+        </a:ln>
+        <a:ln w="25400" cap="flat" cmpd="sng" algn="ctr">
           <a:solidFill>
             <a:schemeClr val="phClr"/>
           </a:solidFill>
           <a:prstDash val="solid"/>
-          <a:miter lim="800000"/>
         </a:ln>
-        <a:ln w="12700" cap="flat" cmpd="sng" algn="ctr">
+        <a:ln w="38100" cap="flat" cmpd="sng" algn="ctr">
           <a:solidFill>
             <a:schemeClr val="phClr"/>
           </a:solidFill>
           <a:prstDash val="solid"/>
-          <a:miter lim="800000"/>
-        </a:ln>
-        <a:ln w="19050" cap="flat" cmpd="sng" algn="ctr">
-          <a:solidFill>
-            <a:schemeClr val="phClr"/>
-          </a:solidFill>
-          <a:prstDash val="solid"/>
-          <a:miter lim="800000"/>
         </a:ln>
       </a:lnStyleLst>
       <a:effectStyleLst>
         <a:effectStyle>
-          <a:effectLst/>
-        </a:effectStyle>
-        <a:effectStyle>
-          <a:effectLst/>
+          <a:effectLst>
+            <a:outerShdw blurRad="40000" dist="20000" dir="5400000" rotWithShape="0">
+              <a:srgbClr val="000000">
+                <a:alpha val="38000"/>
+              </a:srgbClr>
+            </a:outerShdw>
+          </a:effectLst>
         </a:effectStyle>
         <a:effectStyle>
           <a:effectLst>
-            <a:outerShdw blurRad="57150" dist="19050" dir="5400000" algn="ctr" rotWithShape="0">
+            <a:outerShdw blurRad="40000" dist="23000" dir="5400000" rotWithShape="0">
               <a:srgbClr val="000000">
-                <a:alpha val="63000"/>
+                <a:alpha val="35000"/>
               </a:srgbClr>
             </a:outerShdw>
           </a:effectLst>
+        </a:effectStyle>
+        <a:effectStyle>
+          <a:effectLst>
+            <a:outerShdw blurRad="40000" dist="23000" dir="5400000" rotWithShape="0">
+              <a:srgbClr val="000000">
+                <a:alpha val="35000"/>
+              </a:srgbClr>
+            </a:outerShdw>
+          </a:effectLst>
+          <a:scene3d>
+            <a:camera prst="orthographicFront">
+              <a:rot lat="0" lon="0" rev="0"/>
+            </a:camera>
+            <a:lightRig rig="threePt" dir="t">
+              <a:rot lat="0" lon="0" rev="1200000"/>
+            </a:lightRig>
+          </a:scene3d>
+          <a:sp3d>
+            <a:bevelT w="63500" h="25400"/>
+          </a:sp3d>
         </a:effectStyle>
       </a:effectStyleLst>
       <a:bgFillStyleLst>
         <a:solidFill>
           <a:schemeClr val="phClr"/>
         </a:solidFill>
-        <a:solidFill>
-          <a:schemeClr val="phClr">
-            <a:tint val="95000"/>
-            <a:satMod val="170000"/>
-          </a:schemeClr>
-        </a:solidFill>
         <a:gradFill rotWithShape="1">
           <a:gsLst>
             <a:gs pos="0">
               <a:schemeClr val="phClr">
-                <a:tint val="93000"/>
-                <a:satMod val="150000"/>
-                <a:shade val="98000"/>
-                <a:lumMod val="102000"/>
+                <a:tint val="40000"/>
+                <a:satMod val="350000"/>
               </a:schemeClr>
             </a:gs>
-            <a:gs pos="50000">
+            <a:gs pos="40000">
               <a:schemeClr val="phClr">
-                <a:tint val="98000"/>
-                <a:satMod val="130000"/>
-                <a:shade val="90000"/>
-                <a:lumMod val="103000"/>
+                <a:tint val="45000"/>
+                <a:shade val="99000"/>
+                <a:satMod val="350000"/>
               </a:schemeClr>
             </a:gs>
             <a:gs pos="100000">
               <a:schemeClr val="phClr">
-                <a:shade val="63000"/>
-                <a:satMod val="120000"/>
+                <a:shade val="20000"/>
+                <a:satMod val="255000"/>
               </a:schemeClr>
             </a:gs>
           </a:gsLst>
-          <a:lin ang="5400000" scaled="0"/>
+          <a:path path="circle">
+            <a:fillToRect l="50000" t="-80000" r="50000" b="180000"/>
+          </a:path>
+        </a:gradFill>
+        <a:gradFill rotWithShape="1">
+          <a:gsLst>
+            <a:gs pos="0">
+              <a:schemeClr val="phClr">
+                <a:tint val="80000"/>
+                <a:satMod val="300000"/>
+              </a:schemeClr>
+            </a:gs>
+            <a:gs pos="100000">
+              <a:schemeClr val="phClr">
+                <a:shade val="30000"/>
+                <a:satMod val="200000"/>
+              </a:schemeClr>
+            </a:gs>
+          </a:gsLst>
+          <a:path path="circle">
+            <a:fillToRect l="50000" t="50000" r="50000" b="50000"/>
+          </a:path>
         </a:gradFill>
       </a:bgFillStyleLst>
     </a:fmtScheme>
   </a:themeElements>
-  <a:objectDefaults/>
+  <a:objectDefaults>
+    <a:spDef>
+      <a:spPr/>
+      <a:bodyPr/>
+      <a:lstStyle/>
+      <a:style>
+        <a:lnRef idx="1">
+          <a:schemeClr val="accent1"/>
+        </a:lnRef>
+        <a:fillRef idx="3">
+          <a:schemeClr val="accent1"/>
+        </a:fillRef>
+        <a:effectRef idx="2">
+          <a:schemeClr val="accent1"/>
+        </a:effectRef>
+        <a:fontRef idx="minor">
+          <a:schemeClr val="lt1"/>
+        </a:fontRef>
+      </a:style>
+    </a:spDef>
+    <a:lnDef>
+      <a:spPr/>
+      <a:bodyPr/>
+      <a:lstStyle/>
+      <a:style>
+        <a:lnRef idx="2">
+          <a:schemeClr val="accent1"/>
+        </a:lnRef>
+        <a:fillRef idx="0">
+          <a:schemeClr val="accent1"/>
+        </a:fillRef>
+        <a:effectRef idx="1">
+          <a:schemeClr val="accent1"/>
+        </a:effectRef>
+        <a:fontRef idx="minor">
+          <a:schemeClr val="tx1"/>
+        </a:fontRef>
+      </a:style>
+    </a:lnDef>
+  </a:objectDefaults>
   <a:extraClrSchemeLst/>
-  <a:extLst>
-    <a:ext uri="{05A4C25C-085E-4340-85A3-A5531E510DB2}">
-      <thm15:themeFamily xmlns:thm15="http://schemas.microsoft.com/office/thememl/2012/main" name="Office Theme" id="{62F939B6-93AF-4DB8-9C6B-D6C7DFDC589F}" vid="{4A3C46E8-61CC-4603-A589-7422A47A8E4A}"/>
-    </a:ext>
-  </a:extLst>
 </a:theme>
 </file>
</xml_diff>